<commit_message>
Atualização da apresentação na ordem
</commit_message>
<xml_diff>
--- a/SUSTABIL - Apresentação real.pptx
+++ b/SUSTABIL - Apresentação real.pptx
@@ -10,14 +10,17 @@
     <p:sldId id="270" r:id="rId4"/>
     <p:sldId id="258" r:id="rId5"/>
     <p:sldId id="259" r:id="rId6"/>
-    <p:sldId id="260" r:id="rId7"/>
-    <p:sldId id="263" r:id="rId8"/>
-    <p:sldId id="268" r:id="rId9"/>
-    <p:sldId id="262" r:id="rId10"/>
-    <p:sldId id="269" r:id="rId11"/>
-    <p:sldId id="266" r:id="rId12"/>
-    <p:sldId id="267" r:id="rId13"/>
-    <p:sldId id="261" r:id="rId14"/>
+    <p:sldId id="262" r:id="rId7"/>
+    <p:sldId id="272" r:id="rId8"/>
+    <p:sldId id="260" r:id="rId9"/>
+    <p:sldId id="263" r:id="rId10"/>
+    <p:sldId id="268" r:id="rId11"/>
+    <p:sldId id="273" r:id="rId12"/>
+    <p:sldId id="269" r:id="rId13"/>
+    <p:sldId id="266" r:id="rId14"/>
+    <p:sldId id="267" r:id="rId15"/>
+    <p:sldId id="261" r:id="rId16"/>
+    <p:sldId id="271" r:id="rId17"/>
   </p:sldIdLst>
   <p:sldSz cx="12192000" cy="6858000"/>
   <p:notesSz cx="6858000" cy="9144000"/>
@@ -297,7 +300,7 @@
           <a:p>
             <a:fld id="{5D8AFB0F-FD72-4B7A-9B91-BDD5A838F994}" type="datetimeFigureOut">
               <a:rPr lang="pt-BR" smtClean="0"/>
-              <a:t>21/09/20</a:t>
+              <a:t>22/09/20</a:t>
             </a:fld>
             <a:endParaRPr lang="pt-BR"/>
           </a:p>
@@ -495,7 +498,7 @@
           <a:p>
             <a:fld id="{5D8AFB0F-FD72-4B7A-9B91-BDD5A838F994}" type="datetimeFigureOut">
               <a:rPr lang="pt-BR" smtClean="0"/>
-              <a:t>21/09/20</a:t>
+              <a:t>22/09/20</a:t>
             </a:fld>
             <a:endParaRPr lang="pt-BR"/>
           </a:p>
@@ -703,7 +706,7 @@
           <a:p>
             <a:fld id="{5D8AFB0F-FD72-4B7A-9B91-BDD5A838F994}" type="datetimeFigureOut">
               <a:rPr lang="pt-BR" smtClean="0"/>
-              <a:t>21/09/20</a:t>
+              <a:t>22/09/20</a:t>
             </a:fld>
             <a:endParaRPr lang="pt-BR"/>
           </a:p>
@@ -901,7 +904,7 @@
           <a:p>
             <a:fld id="{5D8AFB0F-FD72-4B7A-9B91-BDD5A838F994}" type="datetimeFigureOut">
               <a:rPr lang="pt-BR" smtClean="0"/>
-              <a:t>21/09/20</a:t>
+              <a:t>22/09/20</a:t>
             </a:fld>
             <a:endParaRPr lang="pt-BR"/>
           </a:p>
@@ -1176,7 +1179,7 @@
           <a:p>
             <a:fld id="{5D8AFB0F-FD72-4B7A-9B91-BDD5A838F994}" type="datetimeFigureOut">
               <a:rPr lang="pt-BR" smtClean="0"/>
-              <a:t>21/09/20</a:t>
+              <a:t>22/09/20</a:t>
             </a:fld>
             <a:endParaRPr lang="pt-BR"/>
           </a:p>
@@ -1441,7 +1444,7 @@
           <a:p>
             <a:fld id="{5D8AFB0F-FD72-4B7A-9B91-BDD5A838F994}" type="datetimeFigureOut">
               <a:rPr lang="pt-BR" smtClean="0"/>
-              <a:t>21/09/20</a:t>
+              <a:t>22/09/20</a:t>
             </a:fld>
             <a:endParaRPr lang="pt-BR"/>
           </a:p>
@@ -1853,7 +1856,7 @@
           <a:p>
             <a:fld id="{5D8AFB0F-FD72-4B7A-9B91-BDD5A838F994}" type="datetimeFigureOut">
               <a:rPr lang="pt-BR" smtClean="0"/>
-              <a:t>21/09/20</a:t>
+              <a:t>22/09/20</a:t>
             </a:fld>
             <a:endParaRPr lang="pt-BR"/>
           </a:p>
@@ -1994,7 +1997,7 @@
           <a:p>
             <a:fld id="{5D8AFB0F-FD72-4B7A-9B91-BDD5A838F994}" type="datetimeFigureOut">
               <a:rPr lang="pt-BR" smtClean="0"/>
-              <a:t>21/09/20</a:t>
+              <a:t>22/09/20</a:t>
             </a:fld>
             <a:endParaRPr lang="pt-BR"/>
           </a:p>
@@ -2107,7 +2110,7 @@
           <a:p>
             <a:fld id="{5D8AFB0F-FD72-4B7A-9B91-BDD5A838F994}" type="datetimeFigureOut">
               <a:rPr lang="pt-BR" smtClean="0"/>
-              <a:t>21/09/20</a:t>
+              <a:t>22/09/20</a:t>
             </a:fld>
             <a:endParaRPr lang="pt-BR"/>
           </a:p>
@@ -2418,7 +2421,7 @@
           <a:p>
             <a:fld id="{5D8AFB0F-FD72-4B7A-9B91-BDD5A838F994}" type="datetimeFigureOut">
               <a:rPr lang="pt-BR" smtClean="0"/>
-              <a:t>21/09/20</a:t>
+              <a:t>22/09/20</a:t>
             </a:fld>
             <a:endParaRPr lang="pt-BR"/>
           </a:p>
@@ -2706,7 +2709,7 @@
           <a:p>
             <a:fld id="{5D8AFB0F-FD72-4B7A-9B91-BDD5A838F994}" type="datetimeFigureOut">
               <a:rPr lang="pt-BR" smtClean="0"/>
-              <a:t>21/09/20</a:t>
+              <a:t>22/09/20</a:t>
             </a:fld>
             <a:endParaRPr lang="pt-BR"/>
           </a:p>
@@ -2947,7 +2950,7 @@
           <a:p>
             <a:fld id="{5D8AFB0F-FD72-4B7A-9B91-BDD5A838F994}" type="datetimeFigureOut">
               <a:rPr lang="pt-BR" smtClean="0"/>
-              <a:t>21/09/20</a:t>
+              <a:t>22/09/20</a:t>
             </a:fld>
             <a:endParaRPr lang="pt-BR"/>
           </a:p>
@@ -4623,12 +4626,51 @@
           <a:chExt cx="0" cy="0"/>
         </a:xfrm>
       </p:grpSpPr>
+      <p:cxnSp>
+        <p:nvCxnSpPr>
+          <p:cNvPr id="5" name="Conector reto 4">
+            <a:extLst>
+              <a:ext uri="{FF2B5EF4-FFF2-40B4-BE49-F238E27FC236}">
+                <a16:creationId xmlns:a16="http://schemas.microsoft.com/office/drawing/2014/main" id="{D90523EA-AF65-44BB-8210-EBEF2EABF735}"/>
+              </a:ext>
+            </a:extLst>
+          </p:cNvPr>
+          <p:cNvCxnSpPr>
+            <a:cxnSpLocks/>
+          </p:cNvCxnSpPr>
+          <p:nvPr/>
+        </p:nvCxnSpPr>
+        <p:spPr>
+          <a:xfrm>
+            <a:off x="6096000" y="330200"/>
+            <a:ext cx="0" cy="6134100"/>
+          </a:xfrm>
+          <a:prstGeom prst="line">
+            <a:avLst/>
+          </a:prstGeom>
+          <a:ln/>
+        </p:spPr>
+        <p:style>
+          <a:lnRef idx="3">
+            <a:schemeClr val="accent1"/>
+          </a:lnRef>
+          <a:fillRef idx="0">
+            <a:schemeClr val="accent1"/>
+          </a:fillRef>
+          <a:effectRef idx="2">
+            <a:schemeClr val="accent1"/>
+          </a:effectRef>
+          <a:fontRef idx="minor">
+            <a:schemeClr val="tx1"/>
+          </a:fontRef>
+        </p:style>
+      </p:cxnSp>
       <p:pic>
         <p:nvPicPr>
-          <p:cNvPr id="2" name="Imagem 1">
-            <a:extLst>
-              <a:ext uri="{FF2B5EF4-FFF2-40B4-BE49-F238E27FC236}">
-                <a16:creationId xmlns:a16="http://schemas.microsoft.com/office/drawing/2014/main" id="{17CC1BD6-D813-4835-AF95-799787762A17}"/>
+          <p:cNvPr id="8" name="Imagem 7">
+            <a:extLst>
+              <a:ext uri="{FF2B5EF4-FFF2-40B4-BE49-F238E27FC236}">
+                <a16:creationId xmlns:a16="http://schemas.microsoft.com/office/drawing/2014/main" id="{D90230C0-B25E-48E0-A50E-1492A0D25014}"/>
               </a:ext>
             </a:extLst>
           </p:cNvPr>
@@ -4645,8 +4687,8 @@
         </p:blipFill>
         <p:spPr>
           <a:xfrm>
-            <a:off x="642176" y="1778916"/>
-            <a:ext cx="3548824" cy="4177473"/>
+            <a:off x="53894" y="35169"/>
+            <a:ext cx="1035488" cy="1035488"/>
           </a:xfrm>
           <a:prstGeom prst="rect">
             <a:avLst/>
@@ -4655,10 +4697,10 @@
       </p:pic>
       <p:pic>
         <p:nvPicPr>
-          <p:cNvPr id="3" name="Imagem 2">
-            <a:extLst>
-              <a:ext uri="{FF2B5EF4-FFF2-40B4-BE49-F238E27FC236}">
-                <a16:creationId xmlns:a16="http://schemas.microsoft.com/office/drawing/2014/main" id="{0890E4AA-4730-4DD6-BECF-0678E65A1179}"/>
+          <p:cNvPr id="9" name="Imagem 8" descr="Tela de celular com texto preto sobre fundo branco&#10;&#10;Descrição gerada automaticamente">
+            <a:extLst>
+              <a:ext uri="{FF2B5EF4-FFF2-40B4-BE49-F238E27FC236}">
+                <a16:creationId xmlns:a16="http://schemas.microsoft.com/office/drawing/2014/main" id="{92EA93DF-9609-4623-BA66-B7E60CA13C82}"/>
               </a:ext>
             </a:extLst>
           </p:cNvPr>
@@ -4668,108 +4710,66 @@
           <p:nvPr/>
         </p:nvPicPr>
         <p:blipFill>
-          <a:blip r:embed="rId3"/>
+          <a:blip r:embed="rId3">
+            <a:extLst>
+              <a:ext uri="{28A0092B-C50C-407E-A947-70E740481C1C}">
+                <a14:useLocalDpi xmlns:a14="http://schemas.microsoft.com/office/drawing/2010/main" val="0"/>
+              </a:ext>
+            </a:extLst>
+          </a:blip>
           <a:stretch>
             <a:fillRect/>
           </a:stretch>
         </p:blipFill>
         <p:spPr>
           <a:xfrm>
-            <a:off x="6771191" y="1778916"/>
-            <a:ext cx="3548824" cy="4444321"/>
+            <a:off x="146617" y="1070657"/>
+            <a:ext cx="5850009" cy="5005678"/>
           </a:xfrm>
           <a:prstGeom prst="rect">
             <a:avLst/>
           </a:prstGeom>
         </p:spPr>
       </p:pic>
-      <p:sp>
-        <p:nvSpPr>
-          <p:cNvPr id="6" name="CaixaDeTexto 5">
-            <a:extLst>
-              <a:ext uri="{FF2B5EF4-FFF2-40B4-BE49-F238E27FC236}">
-                <a16:creationId xmlns:a16="http://schemas.microsoft.com/office/drawing/2014/main" id="{A06F92AB-409D-4B71-81F0-71D388E89025}"/>
-              </a:ext>
-            </a:extLst>
-          </p:cNvPr>
-          <p:cNvSpPr txBox="1"/>
+      <p:pic>
+        <p:nvPicPr>
+          <p:cNvPr id="10" name="Imagem 9" descr="Tela de computador com texto preto sobre fundo branco&#10;&#10;Descrição gerada automaticamente">
+            <a:extLst>
+              <a:ext uri="{FF2B5EF4-FFF2-40B4-BE49-F238E27FC236}">
+                <a16:creationId xmlns:a16="http://schemas.microsoft.com/office/drawing/2014/main" id="{5D4B0EC7-BD92-4084-B94F-0FC8F820C43E}"/>
+              </a:ext>
+            </a:extLst>
+          </p:cNvPr>
+          <p:cNvPicPr>
+            <a:picLocks noChangeAspect="1"/>
+          </p:cNvPicPr>
           <p:nvPr/>
-        </p:nvSpPr>
-        <p:spPr>
-          <a:xfrm>
-            <a:off x="642176" y="995958"/>
-            <a:ext cx="4875606" cy="338554"/>
+        </p:nvPicPr>
+        <p:blipFill rotWithShape="1">
+          <a:blip r:embed="rId4">
+            <a:extLst>
+              <a:ext uri="{28A0092B-C50C-407E-A947-70E740481C1C}">
+                <a14:useLocalDpi xmlns:a14="http://schemas.microsoft.com/office/drawing/2010/main" val="0"/>
+              </a:ext>
+            </a:extLst>
+          </a:blip>
+          <a:srcRect l="2957" r="6182" b="-1"/>
+          <a:stretch/>
+        </p:blipFill>
+        <p:spPr>
+          <a:xfrm>
+            <a:off x="6161942" y="1070657"/>
+            <a:ext cx="6030058" cy="4977480"/>
           </a:xfrm>
           <a:prstGeom prst="rect">
             <a:avLst/>
           </a:prstGeom>
-          <a:noFill/>
-        </p:spPr>
-        <p:txBody>
-          <a:bodyPr wrap="square" rtlCol="0">
-            <a:spAutoFit/>
-          </a:bodyPr>
-          <a:lstStyle>
-            <a:defPPr>
-              <a:defRPr lang="pt-BR"/>
-            </a:defPPr>
-            <a:lvl1pPr>
-              <a:defRPr sz="1600" b="1">
-                <a:latin typeface="Arial" panose="020B0604020202020204" pitchFamily="34" charset="0"/>
-                <a:cs typeface="Arial" panose="020B0604020202020204" pitchFamily="34" charset="0"/>
-              </a:defRPr>
-            </a:lvl1pPr>
-          </a:lstStyle>
-          <a:p>
-            <a:r>
-              <a:rPr lang="pt-BR" dirty="0"/>
-              <a:t>Criação do banco de dados e tabela tbClientes:</a:t>
-            </a:r>
-          </a:p>
-        </p:txBody>
-      </p:sp>
-      <p:sp>
-        <p:nvSpPr>
-          <p:cNvPr id="7" name="CaixaDeTexto 6">
-            <a:extLst>
-              <a:ext uri="{FF2B5EF4-FFF2-40B4-BE49-F238E27FC236}">
-                <a16:creationId xmlns:a16="http://schemas.microsoft.com/office/drawing/2014/main" id="{15DF4520-F06C-4C7B-89CE-71C48BC2EA7B}"/>
-              </a:ext>
-            </a:extLst>
-          </p:cNvPr>
-          <p:cNvSpPr txBox="1"/>
-          <p:nvPr/>
-        </p:nvSpPr>
-        <p:spPr>
-          <a:xfrm>
-            <a:off x="6674219" y="995958"/>
-            <a:ext cx="4579620" cy="338554"/>
-          </a:xfrm>
-          <a:prstGeom prst="rect">
-            <a:avLst/>
-          </a:prstGeom>
-          <a:noFill/>
-        </p:spPr>
-        <p:txBody>
-          <a:bodyPr wrap="square" rtlCol="0">
-            <a:spAutoFit/>
-          </a:bodyPr>
-          <a:lstStyle/>
-          <a:p>
-            <a:r>
-              <a:rPr lang="pt-BR" sz="1600" b="1" dirty="0">
-                <a:latin typeface="Arial" panose="020B0604020202020204" pitchFamily="34" charset="0"/>
-                <a:cs typeface="Arial" panose="020B0604020202020204" pitchFamily="34" charset="0"/>
-              </a:rPr>
-              <a:t>Criação das tabelas tbRua e tbSensores:</a:t>
-            </a:r>
-          </a:p>
-        </p:txBody>
-      </p:sp>
+        </p:spPr>
+      </p:pic>
     </p:spTree>
     <p:extLst>
       <p:ext uri="{BB962C8B-B14F-4D97-AF65-F5344CB8AC3E}">
-        <p14:creationId xmlns:p14="http://schemas.microsoft.com/office/powerpoint/2010/main" val="1605510380"/>
+        <p14:creationId xmlns:p14="http://schemas.microsoft.com/office/powerpoint/2010/main" val="1307777368"/>
       </p:ext>
     </p:extLst>
   </p:cSld>
@@ -4796,190 +4796,148 @@
           <a:chExt cx="0" cy="0"/>
         </a:xfrm>
       </p:grpSpPr>
+      <p:sp>
+        <p:nvSpPr>
+          <p:cNvPr id="2" name="Título 1">
+            <a:extLst>
+              <a:ext uri="{FF2B5EF4-FFF2-40B4-BE49-F238E27FC236}">
+                <a16:creationId xmlns:a16="http://schemas.microsoft.com/office/drawing/2014/main" id="{76E79846-F68F-4F1C-8EFB-49E16F0987D8}"/>
+              </a:ext>
+            </a:extLst>
+          </p:cNvPr>
+          <p:cNvSpPr>
+            <a:spLocks noGrp="1"/>
+          </p:cNvSpPr>
+          <p:nvPr>
+            <p:ph type="title"/>
+          </p:nvPr>
+        </p:nvSpPr>
+        <p:spPr/>
+        <p:txBody>
+          <a:bodyPr vert="horz" lIns="91440" tIns="45720" rIns="91440" bIns="45720" rtlCol="0" anchor="ctr">
+            <a:normAutofit/>
+          </a:bodyPr>
+          <a:lstStyle/>
+          <a:p>
+            <a:pPr algn="ctr"/>
+            <a:r>
+              <a:rPr lang="pt-BR" sz="3700" dirty="0">
+                <a:latin typeface="Arial" panose="020B0604020202020204" pitchFamily="34" charset="0"/>
+                <a:cs typeface="Arial" panose="020B0604020202020204" pitchFamily="34" charset="0"/>
+              </a:rPr>
+              <a:t>Simulador Financeiro</a:t>
+            </a:r>
+          </a:p>
+        </p:txBody>
+      </p:sp>
+      <p:sp>
+        <p:nvSpPr>
+          <p:cNvPr id="3" name="CaixaDeTexto 2">
+            <a:extLst>
+              <a:ext uri="{FF2B5EF4-FFF2-40B4-BE49-F238E27FC236}">
+                <a16:creationId xmlns:a16="http://schemas.microsoft.com/office/drawing/2014/main" id="{87A51DD7-9150-47FA-8BCE-ED3D5E6ABDBD}"/>
+              </a:ext>
+            </a:extLst>
+          </p:cNvPr>
+          <p:cNvSpPr txBox="1"/>
+          <p:nvPr/>
+        </p:nvSpPr>
+        <p:spPr>
+          <a:xfrm>
+            <a:off x="3625949" y="3103600"/>
+            <a:ext cx="6695768" cy="369332"/>
+          </a:xfrm>
+          <a:prstGeom prst="rect">
+            <a:avLst/>
+          </a:prstGeom>
+          <a:noFill/>
+        </p:spPr>
+        <p:txBody>
+          <a:bodyPr wrap="square" rtlCol="0">
+            <a:spAutoFit/>
+          </a:bodyPr>
+          <a:lstStyle/>
+          <a:p>
+            <a:r>
+              <a:rPr lang="pt-BR" dirty="0">
+                <a:effectLst>
+                  <a:outerShdw blurRad="38100" dist="38100" dir="2700000" algn="tl">
+                    <a:srgbClr val="000000">
+                      <a:alpha val="43137"/>
+                    </a:srgbClr>
+                  </a:outerShdw>
+                </a:effectLst>
+                <a:latin typeface="Arial" panose="020B0604020202020204" pitchFamily="34" charset="0"/>
+                <a:cs typeface="Arial" panose="020B0604020202020204" pitchFamily="34" charset="0"/>
+              </a:rPr>
+              <a:t>Simulador Financeiro: </a:t>
+            </a:r>
+            <a:r>
+              <a:rPr lang="pt-BR" dirty="0">
+                <a:latin typeface="Arial" panose="020B0604020202020204" pitchFamily="34" charset="0"/>
+                <a:cs typeface="Arial" panose="020B0604020202020204" pitchFamily="34" charset="0"/>
+                <a:hlinkClick r:id="rId2"/>
+              </a:rPr>
+              <a:t>https://simuladorfinanceiro.netlify.app/</a:t>
+            </a:r>
+            <a:endParaRPr lang="pt-BR" dirty="0">
+              <a:latin typeface="Arial" panose="020B0604020202020204" pitchFamily="34" charset="0"/>
+              <a:cs typeface="Arial" panose="020B0604020202020204" pitchFamily="34" charset="0"/>
+            </a:endParaRPr>
+          </a:p>
+        </p:txBody>
+      </p:sp>
       <p:pic>
         <p:nvPicPr>
-          <p:cNvPr id="2" name="Imagem 1">
-            <a:extLst>
-              <a:ext uri="{FF2B5EF4-FFF2-40B4-BE49-F238E27FC236}">
-                <a16:creationId xmlns:a16="http://schemas.microsoft.com/office/drawing/2014/main" id="{C19F7BEF-21A4-4EBE-ADD4-B61FF1C86AE9}"/>
+          <p:cNvPr id="7" name="Picture 2" descr="Sistema de Financeiro | Sistema de Gestão | BlueFocus Software">
+            <a:extLst>
+              <a:ext uri="{FF2B5EF4-FFF2-40B4-BE49-F238E27FC236}">
+                <a16:creationId xmlns:a16="http://schemas.microsoft.com/office/drawing/2014/main" id="{1F6B3A44-3D0A-47A6-B0F4-9BFD06D881BB}"/>
               </a:ext>
             </a:extLst>
           </p:cNvPr>
           <p:cNvPicPr>
-            <a:picLocks noChangeAspect="1"/>
+            <a:picLocks noChangeAspect="1" noChangeArrowheads="1"/>
           </p:cNvPicPr>
           <p:nvPr/>
         </p:nvPicPr>
         <p:blipFill>
-          <a:blip r:embed="rId2"/>
+          <a:blip r:embed="rId3">
+            <a:extLst>
+              <a:ext uri="{28A0092B-C50C-407E-A947-70E740481C1C}">
+                <a14:useLocalDpi xmlns:a14="http://schemas.microsoft.com/office/drawing/2010/main" val="0"/>
+              </a:ext>
+            </a:extLst>
+          </a:blip>
+          <a:srcRect/>
           <a:stretch>
             <a:fillRect/>
           </a:stretch>
         </p:blipFill>
-        <p:spPr>
-          <a:xfrm>
-            <a:off x="398336" y="865966"/>
-            <a:ext cx="8085521" cy="1577477"/>
-          </a:xfrm>
-          <a:prstGeom prst="rect">
-            <a:avLst/>
-          </a:prstGeom>
-        </p:spPr>
-      </p:pic>
-      <p:pic>
-        <p:nvPicPr>
-          <p:cNvPr id="3" name="Imagem 2">
-            <a:extLst>
-              <a:ext uri="{FF2B5EF4-FFF2-40B4-BE49-F238E27FC236}">
-                <a16:creationId xmlns:a16="http://schemas.microsoft.com/office/drawing/2014/main" id="{58C1A49D-2DB9-43C7-B0F5-F68E4A3D03E8}"/>
-              </a:ext>
-            </a:extLst>
-          </p:cNvPr>
-          <p:cNvPicPr>
-            <a:picLocks noChangeAspect="1"/>
-          </p:cNvPicPr>
-          <p:nvPr/>
-        </p:nvPicPr>
-        <p:blipFill>
-          <a:blip r:embed="rId3"/>
-          <a:stretch>
-            <a:fillRect/>
-          </a:stretch>
-        </p:blipFill>
-        <p:spPr>
-          <a:xfrm>
-            <a:off x="8446279" y="946508"/>
-            <a:ext cx="3482642" cy="1341236"/>
-          </a:xfrm>
-          <a:prstGeom prst="rect">
-            <a:avLst/>
-          </a:prstGeom>
-        </p:spPr>
-      </p:pic>
-      <p:pic>
-        <p:nvPicPr>
-          <p:cNvPr id="4" name="Imagem 3">
-            <a:extLst>
-              <a:ext uri="{FF2B5EF4-FFF2-40B4-BE49-F238E27FC236}">
-                <a16:creationId xmlns:a16="http://schemas.microsoft.com/office/drawing/2014/main" id="{C7C04DB2-C0B7-468D-85EC-B66F2571B0F7}"/>
-              </a:ext>
-            </a:extLst>
-          </p:cNvPr>
-          <p:cNvPicPr>
-            <a:picLocks noChangeAspect="1"/>
-          </p:cNvPicPr>
-          <p:nvPr/>
-        </p:nvPicPr>
-        <p:blipFill>
-          <a:blip r:embed="rId4"/>
-          <a:stretch>
-            <a:fillRect/>
-          </a:stretch>
-        </p:blipFill>
-        <p:spPr>
-          <a:xfrm>
-            <a:off x="3810592" y="3103126"/>
-            <a:ext cx="4673265" cy="3715985"/>
-          </a:xfrm>
-          <a:prstGeom prst="rect">
-            <a:avLst/>
-          </a:prstGeom>
-        </p:spPr>
-      </p:pic>
-      <p:sp>
-        <p:nvSpPr>
-          <p:cNvPr id="5" name="CaixaDeTexto 4">
-            <a:extLst>
-              <a:ext uri="{FF2B5EF4-FFF2-40B4-BE49-F238E27FC236}">
-                <a16:creationId xmlns:a16="http://schemas.microsoft.com/office/drawing/2014/main" id="{D05F348A-5DC1-4D17-AC3B-97B6FC677767}"/>
-              </a:ext>
-            </a:extLst>
-          </p:cNvPr>
-          <p:cNvSpPr txBox="1"/>
-          <p:nvPr/>
-        </p:nvSpPr>
-        <p:spPr>
-          <a:xfrm>
-            <a:off x="4091940" y="184666"/>
-            <a:ext cx="4008120" cy="369332"/>
+        <p:spPr bwMode="auto">
+          <a:xfrm>
+            <a:off x="838200" y="1683001"/>
+            <a:ext cx="2787749" cy="2787749"/>
           </a:xfrm>
           <a:prstGeom prst="rect">
             <a:avLst/>
           </a:prstGeom>
           <a:noFill/>
-        </p:spPr>
-        <p:txBody>
-          <a:bodyPr wrap="square" rtlCol="0">
-            <a:spAutoFit/>
-          </a:bodyPr>
-          <a:lstStyle>
-            <a:defPPr>
-              <a:defRPr lang="pt-BR"/>
-            </a:defPPr>
-            <a:lvl1pPr>
-              <a:defRPr sz="1600" b="1">
-                <a:latin typeface="Arial" panose="020B0604020202020204" pitchFamily="34" charset="0"/>
-                <a:cs typeface="Arial" panose="020B0604020202020204" pitchFamily="34" charset="0"/>
-              </a:defRPr>
-            </a:lvl1pPr>
-          </a:lstStyle>
-          <a:p>
-            <a:r>
-              <a:rPr lang="pt-BR" dirty="0"/>
-              <a:t>Inserção de dados na tabela Clientes:</a:t>
-            </a:r>
-          </a:p>
-        </p:txBody>
-      </p:sp>
-      <p:sp>
-        <p:nvSpPr>
-          <p:cNvPr id="6" name="CaixaDeTexto 5">
-            <a:extLst>
-              <a:ext uri="{FF2B5EF4-FFF2-40B4-BE49-F238E27FC236}">
-                <a16:creationId xmlns:a16="http://schemas.microsoft.com/office/drawing/2014/main" id="{897B9B6D-A61B-4497-825B-7A0E52DFBFE7}"/>
-              </a:ext>
-            </a:extLst>
-          </p:cNvPr>
-          <p:cNvSpPr txBox="1"/>
-          <p:nvPr/>
-        </p:nvSpPr>
-        <p:spPr>
-          <a:xfrm>
-            <a:off x="4091940" y="2588618"/>
-            <a:ext cx="4008120" cy="369332"/>
-          </a:xfrm>
-          <a:prstGeom prst="rect">
-            <a:avLst/>
-          </a:prstGeom>
-          <a:noFill/>
-        </p:spPr>
-        <p:txBody>
-          <a:bodyPr wrap="square" rtlCol="0">
-            <a:spAutoFit/>
-          </a:bodyPr>
-          <a:lstStyle>
-            <a:defPPr>
-              <a:defRPr lang="pt-BR"/>
-            </a:defPPr>
-            <a:lvl1pPr>
-              <a:defRPr sz="1600" b="1">
-                <a:latin typeface="Arial" panose="020B0604020202020204" pitchFamily="34" charset="0"/>
-                <a:cs typeface="Arial" panose="020B0604020202020204" pitchFamily="34" charset="0"/>
-              </a:defRPr>
-            </a:lvl1pPr>
-          </a:lstStyle>
-          <a:p>
-            <a:r>
-              <a:rPr lang="pt-BR" dirty="0"/>
-              <a:t>Inserção de dados na tabela Clientes:</a:t>
-            </a:r>
-          </a:p>
-        </p:txBody>
-      </p:sp>
+          <a:extLst>
+            <a:ext uri="{909E8E84-426E-40DD-AFC4-6F175D3DCCD1}">
+              <a14:hiddenFill xmlns:a14="http://schemas.microsoft.com/office/drawing/2010/main">
+                <a:solidFill>
+                  <a:srgbClr val="FFFFFF"/>
+                </a:solidFill>
+              </a14:hiddenFill>
+            </a:ext>
+          </a:extLst>
+        </p:spPr>
+      </p:pic>
     </p:spTree>
     <p:extLst>
       <p:ext uri="{BB962C8B-B14F-4D97-AF65-F5344CB8AC3E}">
-        <p14:creationId xmlns:p14="http://schemas.microsoft.com/office/powerpoint/2010/main" val="2411807073"/>
+        <p14:creationId xmlns:p14="http://schemas.microsoft.com/office/powerpoint/2010/main" val="882302102"/>
       </p:ext>
     </p:extLst>
   </p:cSld>
@@ -5011,7 +4969,7 @@
           <p:cNvPr id="2" name="Imagem 1">
             <a:extLst>
               <a:ext uri="{FF2B5EF4-FFF2-40B4-BE49-F238E27FC236}">
-                <a16:creationId xmlns:a16="http://schemas.microsoft.com/office/drawing/2014/main" id="{46447FED-6765-4E73-AE34-F23C7D378E29}"/>
+                <a16:creationId xmlns:a16="http://schemas.microsoft.com/office/drawing/2014/main" id="{17CC1BD6-D813-4835-AF95-799787762A17}"/>
               </a:ext>
             </a:extLst>
           </p:cNvPr>
@@ -5028,8 +4986,8 @@
         </p:blipFill>
         <p:spPr>
           <a:xfrm>
-            <a:off x="0" y="969616"/>
-            <a:ext cx="10046987" cy="1626927"/>
+            <a:off x="642176" y="1778916"/>
+            <a:ext cx="3548824" cy="4177473"/>
           </a:xfrm>
           <a:prstGeom prst="rect">
             <a:avLst/>
@@ -5041,7 +4999,7 @@
           <p:cNvPr id="3" name="Imagem 2">
             <a:extLst>
               <a:ext uri="{FF2B5EF4-FFF2-40B4-BE49-F238E27FC236}">
-                <a16:creationId xmlns:a16="http://schemas.microsoft.com/office/drawing/2014/main" id="{349DA353-C641-4866-875D-4AAB4915DB8A}"/>
+                <a16:creationId xmlns:a16="http://schemas.microsoft.com/office/drawing/2014/main" id="{0890E4AA-4730-4DD6-BECF-0678E65A1179}"/>
               </a:ext>
             </a:extLst>
           </p:cNvPr>
@@ -5058,80 +5016,20 @@
         </p:blipFill>
         <p:spPr>
           <a:xfrm>
-            <a:off x="10029735" y="969616"/>
-            <a:ext cx="1036198" cy="1609675"/>
+            <a:off x="6771191" y="1778916"/>
+            <a:ext cx="3548824" cy="4444321"/>
           </a:xfrm>
           <a:prstGeom prst="rect">
             <a:avLst/>
           </a:prstGeom>
         </p:spPr>
       </p:pic>
-      <p:pic>
-        <p:nvPicPr>
-          <p:cNvPr id="4" name="Imagem 3">
-            <a:extLst>
-              <a:ext uri="{FF2B5EF4-FFF2-40B4-BE49-F238E27FC236}">
-                <a16:creationId xmlns:a16="http://schemas.microsoft.com/office/drawing/2014/main" id="{E2D19421-69D7-4531-B451-85EF98AF7B04}"/>
-              </a:ext>
-            </a:extLst>
-          </p:cNvPr>
-          <p:cNvPicPr>
-            <a:picLocks noChangeAspect="1"/>
-          </p:cNvPicPr>
-          <p:nvPr/>
-        </p:nvPicPr>
-        <p:blipFill>
-          <a:blip r:embed="rId4"/>
-          <a:stretch>
-            <a:fillRect/>
-          </a:stretch>
-        </p:blipFill>
-        <p:spPr>
-          <a:xfrm>
-            <a:off x="457200" y="3853513"/>
-            <a:ext cx="4112506" cy="1986942"/>
-          </a:xfrm>
-          <a:prstGeom prst="rect">
-            <a:avLst/>
-          </a:prstGeom>
-        </p:spPr>
-      </p:pic>
-      <p:pic>
-        <p:nvPicPr>
-          <p:cNvPr id="5" name="Imagem 4">
-            <a:extLst>
-              <a:ext uri="{FF2B5EF4-FFF2-40B4-BE49-F238E27FC236}">
-                <a16:creationId xmlns:a16="http://schemas.microsoft.com/office/drawing/2014/main" id="{0F6E4D36-B9BA-49A8-BAB3-2E6471FF5591}"/>
-              </a:ext>
-            </a:extLst>
-          </p:cNvPr>
-          <p:cNvPicPr>
-            <a:picLocks noChangeAspect="1"/>
-          </p:cNvPicPr>
-          <p:nvPr/>
-        </p:nvPicPr>
-        <p:blipFill>
-          <a:blip r:embed="rId5"/>
-          <a:stretch>
-            <a:fillRect/>
-          </a:stretch>
-        </p:blipFill>
-        <p:spPr>
-          <a:xfrm>
-            <a:off x="6644275" y="3853513"/>
-            <a:ext cx="4942358" cy="1886887"/>
-          </a:xfrm>
-          <a:prstGeom prst="rect">
-            <a:avLst/>
-          </a:prstGeom>
-        </p:spPr>
-      </p:pic>
       <p:sp>
         <p:nvSpPr>
           <p:cNvPr id="6" name="CaixaDeTexto 5">
             <a:extLst>
               <a:ext uri="{FF2B5EF4-FFF2-40B4-BE49-F238E27FC236}">
-                <a16:creationId xmlns:a16="http://schemas.microsoft.com/office/drawing/2014/main" id="{ABD0B5B1-7BAF-419E-9C90-8C3DC283210A}"/>
+                <a16:creationId xmlns:a16="http://schemas.microsoft.com/office/drawing/2014/main" id="{A06F92AB-409D-4B71-81F0-71D388E89025}"/>
               </a:ext>
             </a:extLst>
           </p:cNvPr>
@@ -5140,8 +5038,8 @@
         </p:nvSpPr>
         <p:spPr>
           <a:xfrm>
-            <a:off x="3441700" y="185698"/>
-            <a:ext cx="4597400" cy="369332"/>
+            <a:off x="642176" y="995958"/>
+            <a:ext cx="4875606" cy="338554"/>
           </a:xfrm>
           <a:prstGeom prst="rect">
             <a:avLst/>
@@ -5166,7 +5064,7 @@
           <a:p>
             <a:r>
               <a:rPr lang="pt-BR" dirty="0"/>
-              <a:t>Buscando os dados da tabela tbClientes:</a:t>
+              <a:t>Criação do banco de dados e tabela tbClientes:</a:t>
             </a:r>
           </a:p>
         </p:txBody>
@@ -5176,7 +5074,7 @@
           <p:cNvPr id="7" name="CaixaDeTexto 6">
             <a:extLst>
               <a:ext uri="{FF2B5EF4-FFF2-40B4-BE49-F238E27FC236}">
-                <a16:creationId xmlns:a16="http://schemas.microsoft.com/office/drawing/2014/main" id="{2E11BFA2-0178-4AFE-8FF0-9F3D56EABE5B}"/>
+                <a16:creationId xmlns:a16="http://schemas.microsoft.com/office/drawing/2014/main" id="{15DF4520-F06C-4C7B-89CE-71C48BC2EA7B}"/>
               </a:ext>
             </a:extLst>
           </p:cNvPr>
@@ -5185,8 +5083,196 @@
         </p:nvSpPr>
         <p:spPr>
           <a:xfrm>
-            <a:off x="457200" y="3244334"/>
-            <a:ext cx="4597400" cy="369332"/>
+            <a:off x="6674219" y="995958"/>
+            <a:ext cx="4579620" cy="338554"/>
+          </a:xfrm>
+          <a:prstGeom prst="rect">
+            <a:avLst/>
+          </a:prstGeom>
+          <a:noFill/>
+        </p:spPr>
+        <p:txBody>
+          <a:bodyPr wrap="square" rtlCol="0">
+            <a:spAutoFit/>
+          </a:bodyPr>
+          <a:lstStyle/>
+          <a:p>
+            <a:r>
+              <a:rPr lang="pt-BR" sz="1600" b="1" dirty="0">
+                <a:latin typeface="Arial" panose="020B0604020202020204" pitchFamily="34" charset="0"/>
+                <a:cs typeface="Arial" panose="020B0604020202020204" pitchFamily="34" charset="0"/>
+              </a:rPr>
+              <a:t>Criação das tabelas tbRua e tbSensores:</a:t>
+            </a:r>
+          </a:p>
+        </p:txBody>
+      </p:sp>
+      <p:pic>
+        <p:nvPicPr>
+          <p:cNvPr id="8" name="Imagem 7">
+            <a:extLst>
+              <a:ext uri="{FF2B5EF4-FFF2-40B4-BE49-F238E27FC236}">
+                <a16:creationId xmlns:a16="http://schemas.microsoft.com/office/drawing/2014/main" id="{CF5325FA-8557-4D77-B0C8-4653C4AD0BA1}"/>
+              </a:ext>
+            </a:extLst>
+          </p:cNvPr>
+          <p:cNvPicPr>
+            <a:picLocks noChangeAspect="1"/>
+          </p:cNvPicPr>
+          <p:nvPr/>
+        </p:nvPicPr>
+        <p:blipFill>
+          <a:blip r:embed="rId4"/>
+          <a:stretch>
+            <a:fillRect/>
+          </a:stretch>
+        </p:blipFill>
+        <p:spPr>
+          <a:xfrm>
+            <a:off x="53894" y="35169"/>
+            <a:ext cx="1035488" cy="1035488"/>
+          </a:xfrm>
+          <a:prstGeom prst="rect">
+            <a:avLst/>
+          </a:prstGeom>
+        </p:spPr>
+      </p:pic>
+    </p:spTree>
+    <p:extLst>
+      <p:ext uri="{BB962C8B-B14F-4D97-AF65-F5344CB8AC3E}">
+        <p14:creationId xmlns:p14="http://schemas.microsoft.com/office/powerpoint/2010/main" val="1605510380"/>
+      </p:ext>
+    </p:extLst>
+  </p:cSld>
+  <p:clrMapOvr>
+    <a:masterClrMapping/>
+  </p:clrMapOvr>
+</p:sld>
+</file>
+
+<file path=ppt/slides/slide13.xml><?xml version="1.0" encoding="utf-8"?>
+<p:sld xmlns:a="http://schemas.openxmlformats.org/drawingml/2006/main" xmlns:r="http://schemas.openxmlformats.org/officeDocument/2006/relationships" xmlns:p="http://schemas.openxmlformats.org/presentationml/2006/main">
+  <p:cSld>
+    <p:spTree>
+      <p:nvGrpSpPr>
+        <p:cNvPr id="1" name=""/>
+        <p:cNvGrpSpPr/>
+        <p:nvPr/>
+      </p:nvGrpSpPr>
+      <p:grpSpPr>
+        <a:xfrm>
+          <a:off x="0" y="0"/>
+          <a:ext cx="0" cy="0"/>
+          <a:chOff x="0" y="0"/>
+          <a:chExt cx="0" cy="0"/>
+        </a:xfrm>
+      </p:grpSpPr>
+      <p:pic>
+        <p:nvPicPr>
+          <p:cNvPr id="2" name="Imagem 1">
+            <a:extLst>
+              <a:ext uri="{FF2B5EF4-FFF2-40B4-BE49-F238E27FC236}">
+                <a16:creationId xmlns:a16="http://schemas.microsoft.com/office/drawing/2014/main" id="{C19F7BEF-21A4-4EBE-ADD4-B61FF1C86AE9}"/>
+              </a:ext>
+            </a:extLst>
+          </p:cNvPr>
+          <p:cNvPicPr>
+            <a:picLocks noChangeAspect="1"/>
+          </p:cNvPicPr>
+          <p:nvPr/>
+        </p:nvPicPr>
+        <p:blipFill>
+          <a:blip r:embed="rId2"/>
+          <a:stretch>
+            <a:fillRect/>
+          </a:stretch>
+        </p:blipFill>
+        <p:spPr>
+          <a:xfrm>
+            <a:off x="398336" y="865966"/>
+            <a:ext cx="8085521" cy="1577477"/>
+          </a:xfrm>
+          <a:prstGeom prst="rect">
+            <a:avLst/>
+          </a:prstGeom>
+        </p:spPr>
+      </p:pic>
+      <p:pic>
+        <p:nvPicPr>
+          <p:cNvPr id="3" name="Imagem 2">
+            <a:extLst>
+              <a:ext uri="{FF2B5EF4-FFF2-40B4-BE49-F238E27FC236}">
+                <a16:creationId xmlns:a16="http://schemas.microsoft.com/office/drawing/2014/main" id="{58C1A49D-2DB9-43C7-B0F5-F68E4A3D03E8}"/>
+              </a:ext>
+            </a:extLst>
+          </p:cNvPr>
+          <p:cNvPicPr>
+            <a:picLocks noChangeAspect="1"/>
+          </p:cNvPicPr>
+          <p:nvPr/>
+        </p:nvPicPr>
+        <p:blipFill>
+          <a:blip r:embed="rId3"/>
+          <a:stretch>
+            <a:fillRect/>
+          </a:stretch>
+        </p:blipFill>
+        <p:spPr>
+          <a:xfrm>
+            <a:off x="8446279" y="946508"/>
+            <a:ext cx="3482642" cy="1341236"/>
+          </a:xfrm>
+          <a:prstGeom prst="rect">
+            <a:avLst/>
+          </a:prstGeom>
+        </p:spPr>
+      </p:pic>
+      <p:pic>
+        <p:nvPicPr>
+          <p:cNvPr id="4" name="Imagem 3">
+            <a:extLst>
+              <a:ext uri="{FF2B5EF4-FFF2-40B4-BE49-F238E27FC236}">
+                <a16:creationId xmlns:a16="http://schemas.microsoft.com/office/drawing/2014/main" id="{C7C04DB2-C0B7-468D-85EC-B66F2571B0F7}"/>
+              </a:ext>
+            </a:extLst>
+          </p:cNvPr>
+          <p:cNvPicPr>
+            <a:picLocks noChangeAspect="1"/>
+          </p:cNvPicPr>
+          <p:nvPr/>
+        </p:nvPicPr>
+        <p:blipFill>
+          <a:blip r:embed="rId4"/>
+          <a:stretch>
+            <a:fillRect/>
+          </a:stretch>
+        </p:blipFill>
+        <p:spPr>
+          <a:xfrm>
+            <a:off x="3810592" y="3103126"/>
+            <a:ext cx="4673265" cy="3715985"/>
+          </a:xfrm>
+          <a:prstGeom prst="rect">
+            <a:avLst/>
+          </a:prstGeom>
+        </p:spPr>
+      </p:pic>
+      <p:sp>
+        <p:nvSpPr>
+          <p:cNvPr id="5" name="CaixaDeTexto 4">
+            <a:extLst>
+              <a:ext uri="{FF2B5EF4-FFF2-40B4-BE49-F238E27FC236}">
+                <a16:creationId xmlns:a16="http://schemas.microsoft.com/office/drawing/2014/main" id="{D05F348A-5DC1-4D17-AC3B-97B6FC677767}"/>
+              </a:ext>
+            </a:extLst>
+          </p:cNvPr>
+          <p:cNvSpPr txBox="1"/>
+          <p:nvPr/>
+        </p:nvSpPr>
+        <p:spPr>
+          <a:xfrm>
+            <a:off x="4091940" y="184666"/>
+            <a:ext cx="4008120" cy="369332"/>
           </a:xfrm>
           <a:prstGeom prst="rect">
             <a:avLst/>
@@ -5211,17 +5297,17 @@
           <a:p>
             <a:r>
               <a:rPr lang="pt-BR" dirty="0"/>
-              <a:t>Buscando os dados da tabela tbRua:</a:t>
-            </a:r>
-          </a:p>
-        </p:txBody>
-      </p:sp>
-      <p:sp>
-        <p:nvSpPr>
-          <p:cNvPr id="8" name="CaixaDeTexto 7">
-            <a:extLst>
-              <a:ext uri="{FF2B5EF4-FFF2-40B4-BE49-F238E27FC236}">
-                <a16:creationId xmlns:a16="http://schemas.microsoft.com/office/drawing/2014/main" id="{90C7EB6A-7384-419D-8FBE-AB3D2D267A80}"/>
+              <a:t>Inserção de dados na tabela Clientes:</a:t>
+            </a:r>
+          </a:p>
+        </p:txBody>
+      </p:sp>
+      <p:sp>
+        <p:nvSpPr>
+          <p:cNvPr id="6" name="CaixaDeTexto 5">
+            <a:extLst>
+              <a:ext uri="{FF2B5EF4-FFF2-40B4-BE49-F238E27FC236}">
+                <a16:creationId xmlns:a16="http://schemas.microsoft.com/office/drawing/2014/main" id="{897B9B6D-A61B-4497-825B-7A0E52DFBFE7}"/>
               </a:ext>
             </a:extLst>
           </p:cNvPr>
@@ -5230,8 +5316,8 @@
         </p:nvSpPr>
         <p:spPr>
           <a:xfrm>
-            <a:off x="7137400" y="3244334"/>
-            <a:ext cx="4597400" cy="369332"/>
+            <a:off x="4091940" y="2588618"/>
+            <a:ext cx="4008120" cy="369332"/>
           </a:xfrm>
           <a:prstGeom prst="rect">
             <a:avLst/>
@@ -5256,11 +5342,356 @@
           <a:p>
             <a:r>
               <a:rPr lang="pt-BR" dirty="0"/>
+              <a:t>Inserção de dados na tabela Clientes:</a:t>
+            </a:r>
+          </a:p>
+        </p:txBody>
+      </p:sp>
+      <p:pic>
+        <p:nvPicPr>
+          <p:cNvPr id="7" name="Imagem 6">
+            <a:extLst>
+              <a:ext uri="{FF2B5EF4-FFF2-40B4-BE49-F238E27FC236}">
+                <a16:creationId xmlns:a16="http://schemas.microsoft.com/office/drawing/2014/main" id="{590574D9-EC53-4982-9565-D07A775EBA14}"/>
+              </a:ext>
+            </a:extLst>
+          </p:cNvPr>
+          <p:cNvPicPr>
+            <a:picLocks noChangeAspect="1"/>
+          </p:cNvPicPr>
+          <p:nvPr/>
+        </p:nvPicPr>
+        <p:blipFill>
+          <a:blip r:embed="rId5"/>
+          <a:stretch>
+            <a:fillRect/>
+          </a:stretch>
+        </p:blipFill>
+        <p:spPr>
+          <a:xfrm>
+            <a:off x="53894" y="35169"/>
+            <a:ext cx="1035488" cy="1035488"/>
+          </a:xfrm>
+          <a:prstGeom prst="rect">
+            <a:avLst/>
+          </a:prstGeom>
+        </p:spPr>
+      </p:pic>
+    </p:spTree>
+    <p:extLst>
+      <p:ext uri="{BB962C8B-B14F-4D97-AF65-F5344CB8AC3E}">
+        <p14:creationId xmlns:p14="http://schemas.microsoft.com/office/powerpoint/2010/main" val="2411807073"/>
+      </p:ext>
+    </p:extLst>
+  </p:cSld>
+  <p:clrMapOvr>
+    <a:masterClrMapping/>
+  </p:clrMapOvr>
+</p:sld>
+</file>
+
+<file path=ppt/slides/slide14.xml><?xml version="1.0" encoding="utf-8"?>
+<p:sld xmlns:a="http://schemas.openxmlformats.org/drawingml/2006/main" xmlns:r="http://schemas.openxmlformats.org/officeDocument/2006/relationships" xmlns:p="http://schemas.openxmlformats.org/presentationml/2006/main">
+  <p:cSld>
+    <p:spTree>
+      <p:nvGrpSpPr>
+        <p:cNvPr id="1" name=""/>
+        <p:cNvGrpSpPr/>
+        <p:nvPr/>
+      </p:nvGrpSpPr>
+      <p:grpSpPr>
+        <a:xfrm>
+          <a:off x="0" y="0"/>
+          <a:ext cx="0" cy="0"/>
+          <a:chOff x="0" y="0"/>
+          <a:chExt cx="0" cy="0"/>
+        </a:xfrm>
+      </p:grpSpPr>
+      <p:pic>
+        <p:nvPicPr>
+          <p:cNvPr id="2" name="Imagem 1">
+            <a:extLst>
+              <a:ext uri="{FF2B5EF4-FFF2-40B4-BE49-F238E27FC236}">
+                <a16:creationId xmlns:a16="http://schemas.microsoft.com/office/drawing/2014/main" id="{46447FED-6765-4E73-AE34-F23C7D378E29}"/>
+              </a:ext>
+            </a:extLst>
+          </p:cNvPr>
+          <p:cNvPicPr>
+            <a:picLocks noChangeAspect="1"/>
+          </p:cNvPicPr>
+          <p:nvPr/>
+        </p:nvPicPr>
+        <p:blipFill>
+          <a:blip r:embed="rId2"/>
+          <a:stretch>
+            <a:fillRect/>
+          </a:stretch>
+        </p:blipFill>
+        <p:spPr>
+          <a:xfrm>
+            <a:off x="0" y="969616"/>
+            <a:ext cx="10046987" cy="1626927"/>
+          </a:xfrm>
+          <a:prstGeom prst="rect">
+            <a:avLst/>
+          </a:prstGeom>
+        </p:spPr>
+      </p:pic>
+      <p:pic>
+        <p:nvPicPr>
+          <p:cNvPr id="3" name="Imagem 2">
+            <a:extLst>
+              <a:ext uri="{FF2B5EF4-FFF2-40B4-BE49-F238E27FC236}">
+                <a16:creationId xmlns:a16="http://schemas.microsoft.com/office/drawing/2014/main" id="{349DA353-C641-4866-875D-4AAB4915DB8A}"/>
+              </a:ext>
+            </a:extLst>
+          </p:cNvPr>
+          <p:cNvPicPr>
+            <a:picLocks noChangeAspect="1"/>
+          </p:cNvPicPr>
+          <p:nvPr/>
+        </p:nvPicPr>
+        <p:blipFill>
+          <a:blip r:embed="rId3"/>
+          <a:stretch>
+            <a:fillRect/>
+          </a:stretch>
+        </p:blipFill>
+        <p:spPr>
+          <a:xfrm>
+            <a:off x="10029735" y="969616"/>
+            <a:ext cx="1036198" cy="1609675"/>
+          </a:xfrm>
+          <a:prstGeom prst="rect">
+            <a:avLst/>
+          </a:prstGeom>
+        </p:spPr>
+      </p:pic>
+      <p:pic>
+        <p:nvPicPr>
+          <p:cNvPr id="4" name="Imagem 3">
+            <a:extLst>
+              <a:ext uri="{FF2B5EF4-FFF2-40B4-BE49-F238E27FC236}">
+                <a16:creationId xmlns:a16="http://schemas.microsoft.com/office/drawing/2014/main" id="{E2D19421-69D7-4531-B451-85EF98AF7B04}"/>
+              </a:ext>
+            </a:extLst>
+          </p:cNvPr>
+          <p:cNvPicPr>
+            <a:picLocks noChangeAspect="1"/>
+          </p:cNvPicPr>
+          <p:nvPr/>
+        </p:nvPicPr>
+        <p:blipFill>
+          <a:blip r:embed="rId4"/>
+          <a:stretch>
+            <a:fillRect/>
+          </a:stretch>
+        </p:blipFill>
+        <p:spPr>
+          <a:xfrm>
+            <a:off x="457200" y="3853513"/>
+            <a:ext cx="4112506" cy="1986942"/>
+          </a:xfrm>
+          <a:prstGeom prst="rect">
+            <a:avLst/>
+          </a:prstGeom>
+        </p:spPr>
+      </p:pic>
+      <p:sp>
+        <p:nvSpPr>
+          <p:cNvPr id="6" name="CaixaDeTexto 5">
+            <a:extLst>
+              <a:ext uri="{FF2B5EF4-FFF2-40B4-BE49-F238E27FC236}">
+                <a16:creationId xmlns:a16="http://schemas.microsoft.com/office/drawing/2014/main" id="{ABD0B5B1-7BAF-419E-9C90-8C3DC283210A}"/>
+              </a:ext>
+            </a:extLst>
+          </p:cNvPr>
+          <p:cNvSpPr txBox="1"/>
+          <p:nvPr/>
+        </p:nvSpPr>
+        <p:spPr>
+          <a:xfrm>
+            <a:off x="3441700" y="185698"/>
+            <a:ext cx="4597400" cy="369332"/>
+          </a:xfrm>
+          <a:prstGeom prst="rect">
+            <a:avLst/>
+          </a:prstGeom>
+          <a:noFill/>
+        </p:spPr>
+        <p:txBody>
+          <a:bodyPr wrap="square" rtlCol="0">
+            <a:spAutoFit/>
+          </a:bodyPr>
+          <a:lstStyle>
+            <a:defPPr>
+              <a:defRPr lang="pt-BR"/>
+            </a:defPPr>
+            <a:lvl1pPr>
+              <a:defRPr sz="1600" b="1">
+                <a:latin typeface="Arial" panose="020B0604020202020204" pitchFamily="34" charset="0"/>
+                <a:cs typeface="Arial" panose="020B0604020202020204" pitchFamily="34" charset="0"/>
+              </a:defRPr>
+            </a:lvl1pPr>
+          </a:lstStyle>
+          <a:p>
+            <a:r>
+              <a:rPr lang="pt-BR" dirty="0"/>
+              <a:t>Buscando os dados da tabela tbClientes:</a:t>
+            </a:r>
+          </a:p>
+        </p:txBody>
+      </p:sp>
+      <p:sp>
+        <p:nvSpPr>
+          <p:cNvPr id="7" name="CaixaDeTexto 6">
+            <a:extLst>
+              <a:ext uri="{FF2B5EF4-FFF2-40B4-BE49-F238E27FC236}">
+                <a16:creationId xmlns:a16="http://schemas.microsoft.com/office/drawing/2014/main" id="{2E11BFA2-0178-4AFE-8FF0-9F3D56EABE5B}"/>
+              </a:ext>
+            </a:extLst>
+          </p:cNvPr>
+          <p:cNvSpPr txBox="1"/>
+          <p:nvPr/>
+        </p:nvSpPr>
+        <p:spPr>
+          <a:xfrm>
+            <a:off x="457200" y="3244334"/>
+            <a:ext cx="4597400" cy="369332"/>
+          </a:xfrm>
+          <a:prstGeom prst="rect">
+            <a:avLst/>
+          </a:prstGeom>
+          <a:noFill/>
+        </p:spPr>
+        <p:txBody>
+          <a:bodyPr wrap="square" rtlCol="0">
+            <a:spAutoFit/>
+          </a:bodyPr>
+          <a:lstStyle>
+            <a:defPPr>
+              <a:defRPr lang="pt-BR"/>
+            </a:defPPr>
+            <a:lvl1pPr>
+              <a:defRPr sz="1600" b="1">
+                <a:latin typeface="Arial" panose="020B0604020202020204" pitchFamily="34" charset="0"/>
+                <a:cs typeface="Arial" panose="020B0604020202020204" pitchFamily="34" charset="0"/>
+              </a:defRPr>
+            </a:lvl1pPr>
+          </a:lstStyle>
+          <a:p>
+            <a:r>
+              <a:rPr lang="pt-BR" dirty="0"/>
+              <a:t>Buscando os dados da tabela tbRua:</a:t>
+            </a:r>
+          </a:p>
+        </p:txBody>
+      </p:sp>
+      <p:sp>
+        <p:nvSpPr>
+          <p:cNvPr id="8" name="CaixaDeTexto 7">
+            <a:extLst>
+              <a:ext uri="{FF2B5EF4-FFF2-40B4-BE49-F238E27FC236}">
+                <a16:creationId xmlns:a16="http://schemas.microsoft.com/office/drawing/2014/main" id="{90C7EB6A-7384-419D-8FBE-AB3D2D267A80}"/>
+              </a:ext>
+            </a:extLst>
+          </p:cNvPr>
+          <p:cNvSpPr txBox="1"/>
+          <p:nvPr/>
+        </p:nvSpPr>
+        <p:spPr>
+          <a:xfrm>
+            <a:off x="7137400" y="3244334"/>
+            <a:ext cx="4597400" cy="369332"/>
+          </a:xfrm>
+          <a:prstGeom prst="rect">
+            <a:avLst/>
+          </a:prstGeom>
+          <a:noFill/>
+        </p:spPr>
+        <p:txBody>
+          <a:bodyPr wrap="square" rtlCol="0">
+            <a:spAutoFit/>
+          </a:bodyPr>
+          <a:lstStyle>
+            <a:defPPr>
+              <a:defRPr lang="pt-BR"/>
+            </a:defPPr>
+            <a:lvl1pPr>
+              <a:defRPr sz="1600" b="1">
+                <a:latin typeface="Arial" panose="020B0604020202020204" pitchFamily="34" charset="0"/>
+                <a:cs typeface="Arial" panose="020B0604020202020204" pitchFamily="34" charset="0"/>
+              </a:defRPr>
+            </a:lvl1pPr>
+          </a:lstStyle>
+          <a:p>
+            <a:r>
+              <a:rPr lang="pt-BR" dirty="0"/>
               <a:t>Buscando os dados da tabela tbSensores:</a:t>
             </a:r>
           </a:p>
         </p:txBody>
       </p:sp>
+      <p:pic>
+        <p:nvPicPr>
+          <p:cNvPr id="9" name="Imagem 8">
+            <a:extLst>
+              <a:ext uri="{FF2B5EF4-FFF2-40B4-BE49-F238E27FC236}">
+                <a16:creationId xmlns:a16="http://schemas.microsoft.com/office/drawing/2014/main" id="{5844951E-9229-41A9-960B-45E58B2A2053}"/>
+              </a:ext>
+            </a:extLst>
+          </p:cNvPr>
+          <p:cNvPicPr>
+            <a:picLocks noChangeAspect="1"/>
+          </p:cNvPicPr>
+          <p:nvPr/>
+        </p:nvPicPr>
+        <p:blipFill>
+          <a:blip r:embed="rId5"/>
+          <a:stretch>
+            <a:fillRect/>
+          </a:stretch>
+        </p:blipFill>
+        <p:spPr>
+          <a:xfrm>
+            <a:off x="53894" y="35169"/>
+            <a:ext cx="1035488" cy="934447"/>
+          </a:xfrm>
+          <a:prstGeom prst="rect">
+            <a:avLst/>
+          </a:prstGeom>
+        </p:spPr>
+      </p:pic>
+      <p:pic>
+        <p:nvPicPr>
+          <p:cNvPr id="10" name="Imagem 9">
+            <a:extLst>
+              <a:ext uri="{FF2B5EF4-FFF2-40B4-BE49-F238E27FC236}">
+                <a16:creationId xmlns:a16="http://schemas.microsoft.com/office/drawing/2014/main" id="{0AA5E581-82DA-4C80-95EE-CA868C15F7D5}"/>
+              </a:ext>
+            </a:extLst>
+          </p:cNvPr>
+          <p:cNvPicPr>
+            <a:picLocks noChangeAspect="1"/>
+          </p:cNvPicPr>
+          <p:nvPr/>
+        </p:nvPicPr>
+        <p:blipFill>
+          <a:blip r:embed="rId6"/>
+          <a:stretch>
+            <a:fillRect/>
+          </a:stretch>
+        </p:blipFill>
+        <p:spPr>
+          <a:xfrm>
+            <a:off x="6533034" y="3853514"/>
+            <a:ext cx="5201766" cy="1986941"/>
+          </a:xfrm>
+          <a:prstGeom prst="rect">
+            <a:avLst/>
+          </a:prstGeom>
+        </p:spPr>
+      </p:pic>
     </p:spTree>
     <p:extLst>
       <p:ext uri="{BB962C8B-B14F-4D97-AF65-F5344CB8AC3E}">
@@ -5274,7 +5705,7 @@
 </p:sld>
 </file>
 
-<file path=ppt/slides/slide13.xml><?xml version="1.0" encoding="utf-8"?>
+<file path=ppt/slides/slide15.xml><?xml version="1.0" encoding="utf-8"?>
 <p:sld xmlns:a="http://schemas.openxmlformats.org/drawingml/2006/main" xmlns:r="http://schemas.openxmlformats.org/officeDocument/2006/relationships" xmlns:p="http://schemas.openxmlformats.org/presentationml/2006/main">
   <p:cSld>
     <p:bg>
@@ -5644,6 +6075,498 @@
     <p:extLst>
       <p:ext uri="{BB962C8B-B14F-4D97-AF65-F5344CB8AC3E}">
         <p14:creationId xmlns:p14="http://schemas.microsoft.com/office/powerpoint/2010/main" val="3707752108"/>
+      </p:ext>
+    </p:extLst>
+  </p:cSld>
+  <p:clrMapOvr>
+    <a:masterClrMapping/>
+  </p:clrMapOvr>
+</p:sld>
+</file>
+
+<file path=ppt/slides/slide16.xml><?xml version="1.0" encoding="utf-8"?>
+<p:sld xmlns:a="http://schemas.openxmlformats.org/drawingml/2006/main" xmlns:r="http://schemas.openxmlformats.org/officeDocument/2006/relationships" xmlns:p="http://schemas.openxmlformats.org/presentationml/2006/main">
+  <p:cSld>
+    <p:bg>
+      <p:bgPr>
+        <a:solidFill>
+          <a:schemeClr val="bg1"/>
+        </a:solidFill>
+        <a:effectLst/>
+      </p:bgPr>
+    </p:bg>
+    <p:spTree>
+      <p:nvGrpSpPr>
+        <p:cNvPr id="1" name=""/>
+        <p:cNvGrpSpPr/>
+        <p:nvPr/>
+      </p:nvGrpSpPr>
+      <p:grpSpPr>
+        <a:xfrm>
+          <a:off x="0" y="0"/>
+          <a:ext cx="0" cy="0"/>
+          <a:chOff x="0" y="0"/>
+          <a:chExt cx="0" cy="0"/>
+        </a:xfrm>
+      </p:grpSpPr>
+      <p:sp useBgFill="1">
+        <p:nvSpPr>
+          <p:cNvPr id="9" name="Rectangle 8">
+            <a:extLst>
+              <a:ext uri="{FF2B5EF4-FFF2-40B4-BE49-F238E27FC236}">
+                <a16:creationId xmlns:a16="http://schemas.microsoft.com/office/drawing/2014/main" id="{3B854194-185D-494D-905C-7C7CB2E30F6E}"/>
+              </a:ext>
+              <a:ext uri="{C183D7F6-B498-43B3-948B-1728B52AA6E4}">
+                <adec:decorative xmlns:adec="http://schemas.microsoft.com/office/drawing/2017/decorative" val="1"/>
+              </a:ext>
+            </a:extLst>
+          </p:cNvPr>
+          <p:cNvSpPr>
+            <a:spLocks noGrp="1" noRot="1" noChangeAspect="1" noMove="1" noResize="1" noEditPoints="1" noAdjustHandles="1" noChangeArrowheads="1" noChangeShapeType="1" noTextEdit="1"/>
+          </p:cNvSpPr>
+          <p:nvPr>
+            <p:extLst>
+              <p:ext uri="{386F3935-93C4-4BCD-93E2-E3B085C9AB24}">
+                <p16:designElem xmlns:p16="http://schemas.microsoft.com/office/powerpoint/2015/main" val="1"/>
+              </p:ext>
+            </p:extLst>
+          </p:nvPr>
+        </p:nvSpPr>
+        <p:spPr>
+          <a:xfrm>
+            <a:off x="1" y="0"/>
+            <a:ext cx="6082110" cy="6858000"/>
+          </a:xfrm>
+          <a:prstGeom prst="rect">
+            <a:avLst/>
+          </a:prstGeom>
+          <a:ln>
+            <a:noFill/>
+          </a:ln>
+        </p:spPr>
+        <p:style>
+          <a:lnRef idx="2">
+            <a:schemeClr val="accent1">
+              <a:shade val="50000"/>
+            </a:schemeClr>
+          </a:lnRef>
+          <a:fillRef idx="1">
+            <a:schemeClr val="accent1"/>
+          </a:fillRef>
+          <a:effectRef idx="0">
+            <a:schemeClr val="accent1"/>
+          </a:effectRef>
+          <a:fontRef idx="minor">
+            <a:schemeClr val="lt1"/>
+          </a:fontRef>
+        </p:style>
+        <p:txBody>
+          <a:bodyPr rtlCol="0" anchor="ctr"/>
+          <a:lstStyle/>
+          <a:p>
+            <a:pPr algn="ctr"/>
+            <a:endParaRPr lang="en-US"/>
+          </a:p>
+        </p:txBody>
+      </p:sp>
+      <p:sp>
+        <p:nvSpPr>
+          <p:cNvPr id="11" name="Rectangle 10">
+            <a:extLst>
+              <a:ext uri="{FF2B5EF4-FFF2-40B4-BE49-F238E27FC236}">
+                <a16:creationId xmlns:a16="http://schemas.microsoft.com/office/drawing/2014/main" id="{B4F5FA0D-0104-4987-8241-EFF7C85B88DE}"/>
+              </a:ext>
+              <a:ext uri="{C183D7F6-B498-43B3-948B-1728B52AA6E4}">
+                <adec:decorative xmlns:adec="http://schemas.microsoft.com/office/drawing/2017/decorative" val="1"/>
+              </a:ext>
+            </a:extLst>
+          </p:cNvPr>
+          <p:cNvSpPr>
+            <a:spLocks noGrp="1" noRot="1" noChangeAspect="1" noMove="1" noResize="1" noEditPoints="1" noAdjustHandles="1" noChangeArrowheads="1" noChangeShapeType="1" noTextEdit="1"/>
+          </p:cNvSpPr>
+          <p:nvPr>
+            <p:extLst>
+              <p:ext uri="{386F3935-93C4-4BCD-93E2-E3B085C9AB24}">
+                <p16:designElem xmlns:p16="http://schemas.microsoft.com/office/powerpoint/2015/main" val="1"/>
+              </p:ext>
+            </p:extLst>
+          </p:nvPr>
+        </p:nvSpPr>
+        <p:spPr>
+          <a:xfrm>
+            <a:off x="1" y="0"/>
+            <a:ext cx="12191998" cy="6858000"/>
+          </a:xfrm>
+          <a:prstGeom prst="rect">
+            <a:avLst/>
+          </a:prstGeom>
+          <a:gradFill>
+            <a:gsLst>
+              <a:gs pos="0">
+                <a:schemeClr val="accent1">
+                  <a:lumMod val="90000"/>
+                </a:schemeClr>
+              </a:gs>
+              <a:gs pos="25000">
+                <a:schemeClr val="accent1">
+                  <a:lumMod val="90000"/>
+                </a:schemeClr>
+              </a:gs>
+              <a:gs pos="94000">
+                <a:schemeClr val="bg2">
+                  <a:lumMod val="25000"/>
+                </a:schemeClr>
+              </a:gs>
+              <a:gs pos="100000">
+                <a:schemeClr val="bg2">
+                  <a:lumMod val="25000"/>
+                </a:schemeClr>
+              </a:gs>
+            </a:gsLst>
+            <a:lin ang="4200000" scaled="0"/>
+          </a:gradFill>
+          <a:ln>
+            <a:noFill/>
+          </a:ln>
+        </p:spPr>
+        <p:style>
+          <a:lnRef idx="2">
+            <a:schemeClr val="accent1">
+              <a:shade val="50000"/>
+            </a:schemeClr>
+          </a:lnRef>
+          <a:fillRef idx="1">
+            <a:schemeClr val="accent1"/>
+          </a:fillRef>
+          <a:effectRef idx="0">
+            <a:schemeClr val="accent1"/>
+          </a:effectRef>
+          <a:fontRef idx="minor">
+            <a:schemeClr val="lt1"/>
+          </a:fontRef>
+        </p:style>
+        <p:txBody>
+          <a:bodyPr rtlCol="0" anchor="ctr"/>
+          <a:lstStyle/>
+          <a:p>
+            <a:pPr algn="ctr"/>
+            <a:endParaRPr lang="en-US"/>
+          </a:p>
+        </p:txBody>
+      </p:sp>
+      <p:pic>
+        <p:nvPicPr>
+          <p:cNvPr id="13" name="Picture 12">
+            <a:extLst>
+              <a:ext uri="{FF2B5EF4-FFF2-40B4-BE49-F238E27FC236}">
+                <a16:creationId xmlns:a16="http://schemas.microsoft.com/office/drawing/2014/main" id="{2897127E-6CEF-446C-BE87-93B7C46E49D1}"/>
+              </a:ext>
+              <a:ext uri="{C183D7F6-B498-43B3-948B-1728B52AA6E4}">
+                <adec:decorative xmlns:adec="http://schemas.microsoft.com/office/drawing/2017/decorative" val="1"/>
+              </a:ext>
+            </a:extLst>
+          </p:cNvPr>
+          <p:cNvPicPr>
+            <a:picLocks noGrp="1" noRot="1" noChangeAspect="1" noMove="1" noResize="1" noEditPoints="1" noAdjustHandles="1" noChangeArrowheads="1" noChangeShapeType="1" noCrop="1"/>
+          </p:cNvPicPr>
+          <p:nvPr>
+            <p:extLst>
+              <p:ext uri="{386F3935-93C4-4BCD-93E2-E3B085C9AB24}">
+                <p16:designElem xmlns:p16="http://schemas.microsoft.com/office/powerpoint/2015/main" val="1"/>
+              </p:ext>
+            </p:extLst>
+          </p:nvPr>
+        </p:nvPicPr>
+        <p:blipFill>
+          <a:blip r:embed="rId2">
+            <a:extLst>
+              <a:ext uri="{28A0092B-C50C-407E-A947-70E740481C1C}">
+                <a14:useLocalDpi xmlns:a14="http://schemas.microsoft.com/office/drawing/2010/main" val="0"/>
+              </a:ext>
+            </a:extLst>
+          </a:blip>
+          <a:stretch>
+            <a:fillRect/>
+          </a:stretch>
+        </p:blipFill>
+        <p:spPr>
+          <a:xfrm>
+            <a:off x="0" y="0"/>
+            <a:ext cx="12192000" cy="6858000"/>
+          </a:xfrm>
+          <a:prstGeom prst="rect">
+            <a:avLst/>
+          </a:prstGeom>
+        </p:spPr>
+      </p:pic>
+      <p:sp>
+        <p:nvSpPr>
+          <p:cNvPr id="2" name="Título 1">
+            <a:extLst>
+              <a:ext uri="{FF2B5EF4-FFF2-40B4-BE49-F238E27FC236}">
+                <a16:creationId xmlns:a16="http://schemas.microsoft.com/office/drawing/2014/main" id="{256D159D-F40E-49A0-9109-60513704A390}"/>
+              </a:ext>
+            </a:extLst>
+          </p:cNvPr>
+          <p:cNvSpPr>
+            <a:spLocks noGrp="1"/>
+          </p:cNvSpPr>
+          <p:nvPr>
+            <p:ph type="title"/>
+          </p:nvPr>
+        </p:nvSpPr>
+        <p:spPr>
+          <a:xfrm>
+            <a:off x="640079" y="2053641"/>
+            <a:ext cx="3669161" cy="2760098"/>
+          </a:xfrm>
+        </p:spPr>
+        <p:txBody>
+          <a:bodyPr>
+            <a:normAutofit/>
+          </a:bodyPr>
+          <a:lstStyle/>
+          <a:p>
+            <a:r>
+              <a:rPr lang="pt-BR" b="1">
+                <a:solidFill>
+                  <a:srgbClr val="FFFFFF"/>
+                </a:solidFill>
+                <a:latin typeface="Arial" panose="020B0604020202020204" pitchFamily="34" charset="0"/>
+                <a:cs typeface="Arial" panose="020B0604020202020204" pitchFamily="34" charset="0"/>
+              </a:rPr>
+              <a:t>A Sustabil agradece pela atenção de todos</a:t>
+            </a:r>
+          </a:p>
+        </p:txBody>
+      </p:sp>
+      <p:sp>
+        <p:nvSpPr>
+          <p:cNvPr id="3" name="Espaço Reservado para Conteúdo 2">
+            <a:extLst>
+              <a:ext uri="{FF2B5EF4-FFF2-40B4-BE49-F238E27FC236}">
+                <a16:creationId xmlns:a16="http://schemas.microsoft.com/office/drawing/2014/main" id="{5440C41A-5943-4012-80B3-389EB74618C2}"/>
+              </a:ext>
+            </a:extLst>
+          </p:cNvPr>
+          <p:cNvSpPr>
+            <a:spLocks noGrp="1"/>
+          </p:cNvSpPr>
+          <p:nvPr>
+            <p:ph idx="1"/>
+          </p:nvPr>
+        </p:nvSpPr>
+        <p:spPr>
+          <a:xfrm>
+            <a:off x="6090574" y="801866"/>
+            <a:ext cx="5306084" cy="5230634"/>
+          </a:xfrm>
+        </p:spPr>
+        <p:txBody>
+          <a:bodyPr anchor="ctr">
+            <a:normAutofit/>
+          </a:bodyPr>
+          <a:lstStyle/>
+          <a:p>
+            <a:r>
+              <a:rPr lang="pt-BR" sz="2400" b="1" dirty="0">
+                <a:solidFill>
+                  <a:srgbClr val="000000"/>
+                </a:solidFill>
+                <a:latin typeface="Arial" panose="020B0604020202020204" pitchFamily="34" charset="0"/>
+                <a:cs typeface="Arial" panose="020B0604020202020204" pitchFamily="34" charset="0"/>
+              </a:rPr>
+              <a:t>Nossos contatos</a:t>
+            </a:r>
+            <a:r>
+              <a:rPr lang="pt-BR" sz="2400" dirty="0">
+                <a:solidFill>
+                  <a:srgbClr val="000000"/>
+                </a:solidFill>
+                <a:latin typeface="Arial" panose="020B0604020202020204" pitchFamily="34" charset="0"/>
+                <a:cs typeface="Arial" panose="020B0604020202020204" pitchFamily="34" charset="0"/>
+              </a:rPr>
+              <a:t>:</a:t>
+            </a:r>
+          </a:p>
+          <a:p>
+            <a:pPr marL="0" indent="0">
+              <a:buNone/>
+            </a:pPr>
+            <a:endParaRPr lang="pt-BR" sz="2400" dirty="0">
+              <a:solidFill>
+                <a:srgbClr val="000000"/>
+              </a:solidFill>
+              <a:latin typeface="Arial" panose="020B0604020202020204" pitchFamily="34" charset="0"/>
+              <a:cs typeface="Arial" panose="020B0604020202020204" pitchFamily="34" charset="0"/>
+            </a:endParaRPr>
+          </a:p>
+          <a:p>
+            <a:pPr>
+              <a:buFont typeface="Wingdings" panose="05000000000000000000" pitchFamily="2" charset="2"/>
+              <a:buChar char="Ø"/>
+            </a:pPr>
+            <a:r>
+              <a:rPr lang="pt-BR" sz="2400" dirty="0">
+                <a:solidFill>
+                  <a:srgbClr val="000000"/>
+                </a:solidFill>
+                <a:effectLst>
+                  <a:outerShdw blurRad="38100" dist="38100" dir="2700000" algn="tl">
+                    <a:srgbClr val="000000">
+                      <a:alpha val="43137"/>
+                    </a:srgbClr>
+                  </a:outerShdw>
+                </a:effectLst>
+                <a:latin typeface="Arial" panose="020B0604020202020204" pitchFamily="34" charset="0"/>
+                <a:cs typeface="Arial" panose="020B0604020202020204" pitchFamily="34" charset="0"/>
+              </a:rPr>
+              <a:t>Celular</a:t>
+            </a:r>
+            <a:r>
+              <a:rPr lang="pt-BR" sz="2400" dirty="0">
+                <a:solidFill>
+                  <a:srgbClr val="000000"/>
+                </a:solidFill>
+                <a:latin typeface="Arial" panose="020B0604020202020204" pitchFamily="34" charset="0"/>
+                <a:cs typeface="Arial" panose="020B0604020202020204" pitchFamily="34" charset="0"/>
+              </a:rPr>
+              <a:t>: (11) 94834-8922</a:t>
+            </a:r>
+          </a:p>
+          <a:p>
+            <a:pPr>
+              <a:buFont typeface="Wingdings" panose="05000000000000000000" pitchFamily="2" charset="2"/>
+              <a:buChar char="Ø"/>
+            </a:pPr>
+            <a:r>
+              <a:rPr lang="pt-BR" sz="2400" dirty="0">
+                <a:solidFill>
+                  <a:srgbClr val="000000"/>
+                </a:solidFill>
+                <a:effectLst>
+                  <a:outerShdw blurRad="38100" dist="38100" dir="2700000" algn="tl">
+                    <a:srgbClr val="000000">
+                      <a:alpha val="43137"/>
+                    </a:srgbClr>
+                  </a:outerShdw>
+                </a:effectLst>
+                <a:latin typeface="Arial" panose="020B0604020202020204" pitchFamily="34" charset="0"/>
+                <a:cs typeface="Arial" panose="020B0604020202020204" pitchFamily="34" charset="0"/>
+              </a:rPr>
+              <a:t>Tel. Comercial</a:t>
+            </a:r>
+            <a:r>
+              <a:rPr lang="pt-BR" sz="2400" dirty="0">
+                <a:solidFill>
+                  <a:srgbClr val="000000"/>
+                </a:solidFill>
+                <a:latin typeface="Arial" panose="020B0604020202020204" pitchFamily="34" charset="0"/>
+                <a:cs typeface="Arial" panose="020B0604020202020204" pitchFamily="34" charset="0"/>
+              </a:rPr>
+              <a:t>: (11) 5514-3258</a:t>
+            </a:r>
+          </a:p>
+          <a:p>
+            <a:pPr>
+              <a:buFont typeface="Wingdings" panose="05000000000000000000" pitchFamily="2" charset="2"/>
+              <a:buChar char="Ø"/>
+            </a:pPr>
+            <a:endParaRPr lang="pt-BR" sz="2400" dirty="0">
+              <a:solidFill>
+                <a:srgbClr val="000000"/>
+              </a:solidFill>
+              <a:latin typeface="Arial" panose="020B0604020202020204" pitchFamily="34" charset="0"/>
+              <a:cs typeface="Arial" panose="020B0604020202020204" pitchFamily="34" charset="0"/>
+            </a:endParaRPr>
+          </a:p>
+          <a:p>
+            <a:pPr>
+              <a:buFont typeface="Wingdings" panose="05000000000000000000" pitchFamily="2" charset="2"/>
+              <a:buChar char="Ø"/>
+            </a:pPr>
+            <a:r>
+              <a:rPr lang="pt-BR" sz="2400" dirty="0">
+                <a:solidFill>
+                  <a:srgbClr val="000000"/>
+                </a:solidFill>
+                <a:effectLst>
+                  <a:outerShdw blurRad="38100" dist="38100" dir="2700000" algn="tl">
+                    <a:srgbClr val="000000">
+                      <a:alpha val="43137"/>
+                    </a:srgbClr>
+                  </a:outerShdw>
+                </a:effectLst>
+                <a:latin typeface="Arial" panose="020B0604020202020204" pitchFamily="34" charset="0"/>
+                <a:cs typeface="Arial" panose="020B0604020202020204" pitchFamily="34" charset="0"/>
+              </a:rPr>
+              <a:t>E-mail</a:t>
+            </a:r>
+            <a:r>
+              <a:rPr lang="pt-BR" sz="2400" dirty="0">
+                <a:solidFill>
+                  <a:srgbClr val="000000"/>
+                </a:solidFill>
+                <a:latin typeface="Arial" panose="020B0604020202020204" pitchFamily="34" charset="0"/>
+                <a:cs typeface="Arial" panose="020B0604020202020204" pitchFamily="34" charset="0"/>
+              </a:rPr>
+              <a:t>: </a:t>
+            </a:r>
+            <a:r>
+              <a:rPr lang="pt-BR" sz="2400" dirty="0">
+                <a:solidFill>
+                  <a:srgbClr val="000000"/>
+                </a:solidFill>
+                <a:latin typeface="Arial" panose="020B0604020202020204" pitchFamily="34" charset="0"/>
+                <a:cs typeface="Arial" panose="020B0604020202020204" pitchFamily="34" charset="0"/>
+                <a:hlinkClick r:id="rId3"/>
+              </a:rPr>
+              <a:t>sustabil@bandtec.com.br</a:t>
+            </a:r>
+            <a:endParaRPr lang="pt-BR" sz="2400" dirty="0">
+              <a:solidFill>
+                <a:srgbClr val="000000"/>
+              </a:solidFill>
+              <a:latin typeface="Arial" panose="020B0604020202020204" pitchFamily="34" charset="0"/>
+              <a:cs typeface="Arial" panose="020B0604020202020204" pitchFamily="34" charset="0"/>
+            </a:endParaRPr>
+          </a:p>
+        </p:txBody>
+      </p:sp>
+      <p:pic>
+        <p:nvPicPr>
+          <p:cNvPr id="4" name="Imagem 3">
+            <a:extLst>
+              <a:ext uri="{FF2B5EF4-FFF2-40B4-BE49-F238E27FC236}">
+                <a16:creationId xmlns:a16="http://schemas.microsoft.com/office/drawing/2014/main" id="{FC14E8B6-392A-4C5B-BF9E-8118C887D996}"/>
+              </a:ext>
+            </a:extLst>
+          </p:cNvPr>
+          <p:cNvPicPr>
+            <a:picLocks noChangeAspect="1"/>
+          </p:cNvPicPr>
+          <p:nvPr/>
+        </p:nvPicPr>
+        <p:blipFill>
+          <a:blip r:embed="rId4"/>
+          <a:stretch>
+            <a:fillRect/>
+          </a:stretch>
+        </p:blipFill>
+        <p:spPr>
+          <a:xfrm>
+            <a:off x="53894" y="35169"/>
+            <a:ext cx="1035488" cy="1035488"/>
+          </a:xfrm>
+          <a:prstGeom prst="rect">
+            <a:avLst/>
+          </a:prstGeom>
+        </p:spPr>
+      </p:pic>
+    </p:spTree>
+    <p:extLst>
+      <p:ext uri="{BB962C8B-B14F-4D97-AF65-F5344CB8AC3E}">
+        <p14:creationId xmlns:p14="http://schemas.microsoft.com/office/powerpoint/2010/main" val="725435928"/>
       </p:ext>
     </p:extLst>
   </p:cSld>
@@ -6572,6 +7495,36 @@
           </a:prstGeom>
         </p:spPr>
       </p:pic>
+      <p:pic>
+        <p:nvPicPr>
+          <p:cNvPr id="4" name="Imagem 3">
+            <a:extLst>
+              <a:ext uri="{FF2B5EF4-FFF2-40B4-BE49-F238E27FC236}">
+                <a16:creationId xmlns:a16="http://schemas.microsoft.com/office/drawing/2014/main" id="{CE35213D-879D-49E6-B589-EDD17C131C65}"/>
+              </a:ext>
+            </a:extLst>
+          </p:cNvPr>
+          <p:cNvPicPr>
+            <a:picLocks noChangeAspect="1"/>
+          </p:cNvPicPr>
+          <p:nvPr/>
+        </p:nvPicPr>
+        <p:blipFill>
+          <a:blip r:embed="rId3"/>
+          <a:stretch>
+            <a:fillRect/>
+          </a:stretch>
+        </p:blipFill>
+        <p:spPr>
+          <a:xfrm>
+            <a:off x="53894" y="35169"/>
+            <a:ext cx="1035488" cy="1035488"/>
+          </a:xfrm>
+          <a:prstGeom prst="rect">
+            <a:avLst/>
+          </a:prstGeom>
+        </p:spPr>
+      </p:pic>
     </p:spTree>
     <p:extLst>
       <p:ext uri="{BB962C8B-B14F-4D97-AF65-F5344CB8AC3E}">
@@ -7275,6 +8228,1055 @@
 <file path=ppt/slides/slide6.xml><?xml version="1.0" encoding="utf-8"?>
 <p:sld xmlns:a="http://schemas.openxmlformats.org/drawingml/2006/main" xmlns:r="http://schemas.openxmlformats.org/officeDocument/2006/relationships" xmlns:p="http://schemas.openxmlformats.org/presentationml/2006/main">
   <p:cSld>
+    <p:spTree>
+      <p:nvGrpSpPr>
+        <p:cNvPr id="1" name=""/>
+        <p:cNvGrpSpPr/>
+        <p:nvPr/>
+      </p:nvGrpSpPr>
+      <p:grpSpPr>
+        <a:xfrm>
+          <a:off x="0" y="0"/>
+          <a:ext cx="0" cy="0"/>
+          <a:chOff x="0" y="0"/>
+          <a:chExt cx="0" cy="0"/>
+        </a:xfrm>
+      </p:grpSpPr>
+      <p:sp>
+        <p:nvSpPr>
+          <p:cNvPr id="2" name="Título 1">
+            <a:extLst>
+              <a:ext uri="{FF2B5EF4-FFF2-40B4-BE49-F238E27FC236}">
+                <a16:creationId xmlns:a16="http://schemas.microsoft.com/office/drawing/2014/main" id="{81717266-6AEC-4E54-ABDD-4B3A2718C4F3}"/>
+              </a:ext>
+            </a:extLst>
+          </p:cNvPr>
+          <p:cNvSpPr>
+            <a:spLocks noGrp="1"/>
+          </p:cNvSpPr>
+          <p:nvPr>
+            <p:ph type="title"/>
+          </p:nvPr>
+        </p:nvSpPr>
+        <p:spPr>
+          <a:xfrm>
+            <a:off x="838199" y="708890"/>
+            <a:ext cx="10515600" cy="1325563"/>
+          </a:xfrm>
+        </p:spPr>
+        <p:txBody>
+          <a:bodyPr>
+            <a:normAutofit/>
+          </a:bodyPr>
+          <a:lstStyle/>
+          <a:p>
+            <a:pPr algn="ctr"/>
+            <a:r>
+              <a:rPr lang="pt-BR" sz="3700" dirty="0">
+                <a:latin typeface="Arial" panose="020B0604020202020204" pitchFamily="34" charset="0"/>
+                <a:cs typeface="Arial" panose="020B0604020202020204" pitchFamily="34" charset="0"/>
+              </a:rPr>
+              <a:t>Onde os dados são armazenados?</a:t>
+            </a:r>
+          </a:p>
+        </p:txBody>
+      </p:sp>
+      <p:pic>
+        <p:nvPicPr>
+          <p:cNvPr id="4" name="Picture 2" descr="Waste Water Treatment Leakage Broke Svg Png Icon Free Download (#569149) -  OnlineWebFonts.COM">
+            <a:extLst>
+              <a:ext uri="{FF2B5EF4-FFF2-40B4-BE49-F238E27FC236}">
+                <a16:creationId xmlns:a16="http://schemas.microsoft.com/office/drawing/2014/main" id="{A9027475-A512-4FFC-B95F-6730DF59B3DE}"/>
+              </a:ext>
+            </a:extLst>
+          </p:cNvPr>
+          <p:cNvPicPr>
+            <a:picLocks noChangeAspect="1" noChangeArrowheads="1"/>
+          </p:cNvPicPr>
+          <p:nvPr/>
+        </p:nvPicPr>
+        <p:blipFill rotWithShape="1">
+          <a:blip r:embed="rId2">
+            <a:alphaModFix/>
+            <a:extLst>
+              <a:ext uri="{28A0092B-C50C-407E-A947-70E740481C1C}">
+                <a14:useLocalDpi xmlns:a14="http://schemas.microsoft.com/office/drawing/2010/main" val="0"/>
+              </a:ext>
+            </a:extLst>
+          </a:blip>
+          <a:srcRect r="548"/>
+          <a:stretch/>
+        </p:blipFill>
+        <p:spPr bwMode="auto">
+          <a:xfrm>
+            <a:off x="314372" y="4851908"/>
+            <a:ext cx="1870411" cy="2006092"/>
+          </a:xfrm>
+          <a:prstGeom prst="rect">
+            <a:avLst/>
+          </a:prstGeom>
+          <a:noFill/>
+          <a:extLst>
+            <a:ext uri="{909E8E84-426E-40DD-AFC4-6F175D3DCCD1}">
+              <a14:hiddenFill xmlns:a14="http://schemas.microsoft.com/office/drawing/2010/main">
+                <a:solidFill>
+                  <a:srgbClr val="FFFFFF"/>
+                </a:solidFill>
+              </a14:hiddenFill>
+            </a:ext>
+          </a:extLst>
+        </p:spPr>
+      </p:pic>
+      <p:pic>
+        <p:nvPicPr>
+          <p:cNvPr id="5" name="Picture 6" descr="temperature and humidity sensor">
+            <a:extLst>
+              <a:ext uri="{FF2B5EF4-FFF2-40B4-BE49-F238E27FC236}">
+                <a16:creationId xmlns:a16="http://schemas.microsoft.com/office/drawing/2014/main" id="{B285B2BE-0AF8-4A57-823E-D0EFFB44C254}"/>
+              </a:ext>
+            </a:extLst>
+          </p:cNvPr>
+          <p:cNvPicPr>
+            <a:picLocks noChangeAspect="1" noChangeArrowheads="1"/>
+          </p:cNvPicPr>
+          <p:nvPr/>
+        </p:nvPicPr>
+        <p:blipFill>
+          <a:blip r:embed="rId3">
+            <a:extLst>
+              <a:ext uri="{28A0092B-C50C-407E-A947-70E740481C1C}">
+                <a14:useLocalDpi xmlns:a14="http://schemas.microsoft.com/office/drawing/2010/main" val="0"/>
+              </a:ext>
+            </a:extLst>
+          </a:blip>
+          <a:srcRect/>
+          <a:stretch>
+            <a:fillRect/>
+          </a:stretch>
+        </p:blipFill>
+        <p:spPr bwMode="auto">
+          <a:xfrm rot="18635752">
+            <a:off x="1092002" y="6225041"/>
+            <a:ext cx="315149" cy="315149"/>
+          </a:xfrm>
+          <a:prstGeom prst="rect">
+            <a:avLst/>
+          </a:prstGeom>
+          <a:noFill/>
+          <a:extLst>
+            <a:ext uri="{909E8E84-426E-40DD-AFC4-6F175D3DCCD1}">
+              <a14:hiddenFill xmlns:a14="http://schemas.microsoft.com/office/drawing/2010/main">
+                <a:solidFill>
+                  <a:srgbClr val="FFFFFF"/>
+                </a:solidFill>
+              </a14:hiddenFill>
+            </a:ext>
+          </a:extLst>
+        </p:spPr>
+      </p:pic>
+      <p:pic>
+        <p:nvPicPr>
+          <p:cNvPr id="6" name="Picture 8" descr="Alert Alt Svg Png Icon Free Download (#565392) - OnlineWebFonts.COM">
+            <a:extLst>
+              <a:ext uri="{FF2B5EF4-FFF2-40B4-BE49-F238E27FC236}">
+                <a16:creationId xmlns:a16="http://schemas.microsoft.com/office/drawing/2014/main" id="{2E7665F3-0BAE-4C54-AF17-EF1B6CAB0B8F}"/>
+              </a:ext>
+            </a:extLst>
+          </p:cNvPr>
+          <p:cNvPicPr>
+            <a:picLocks noChangeAspect="1" noChangeArrowheads="1"/>
+          </p:cNvPicPr>
+          <p:nvPr/>
+        </p:nvPicPr>
+        <p:blipFill rotWithShape="1">
+          <a:blip r:embed="rId4">
+            <a:duotone>
+              <a:schemeClr val="accent2">
+                <a:shade val="45000"/>
+                <a:satMod val="135000"/>
+              </a:schemeClr>
+              <a:prstClr val="white"/>
+            </a:duotone>
+            <a:alphaModFix/>
+            <a:extLst>
+              <a:ext uri="{BEBA8EAE-BF5A-486C-A8C5-ECC9F3942E4B}">
+                <a14:imgProps xmlns:a14="http://schemas.microsoft.com/office/drawing/2010/main">
+                  <a14:imgLayer r:embed="rId5">
+                    <a14:imgEffect>
+                      <a14:colorTemperature colorTemp="6360"/>
+                    </a14:imgEffect>
+                    <a14:imgEffect>
+                      <a14:saturation sat="191000"/>
+                    </a14:imgEffect>
+                  </a14:imgLayer>
+                </a14:imgProps>
+              </a:ext>
+              <a:ext uri="{28A0092B-C50C-407E-A947-70E740481C1C}">
+                <a14:useLocalDpi xmlns:a14="http://schemas.microsoft.com/office/drawing/2010/main" val="0"/>
+              </a:ext>
+            </a:extLst>
+          </a:blip>
+          <a:srcRect b="72111"/>
+          <a:stretch/>
+        </p:blipFill>
+        <p:spPr bwMode="auto">
+          <a:xfrm rot="13158707">
+            <a:off x="841771" y="6471416"/>
+            <a:ext cx="491158" cy="209764"/>
+          </a:xfrm>
+          <a:prstGeom prst="rect">
+            <a:avLst/>
+          </a:prstGeom>
+          <a:noFill/>
+          <a:ln>
+            <a:noFill/>
+          </a:ln>
+        </p:spPr>
+      </p:pic>
+      <p:pic>
+        <p:nvPicPr>
+          <p:cNvPr id="1026" name="Picture 2" descr="poste elétrico - ícones de eletrônicos grátis">
+            <a:extLst>
+              <a:ext uri="{FF2B5EF4-FFF2-40B4-BE49-F238E27FC236}">
+                <a16:creationId xmlns:a16="http://schemas.microsoft.com/office/drawing/2014/main" id="{49B43E45-D4D5-48F4-8B57-4A932C3C7CD5}"/>
+              </a:ext>
+            </a:extLst>
+          </p:cNvPr>
+          <p:cNvPicPr>
+            <a:picLocks noChangeAspect="1" noChangeArrowheads="1"/>
+          </p:cNvPicPr>
+          <p:nvPr/>
+        </p:nvPicPr>
+        <p:blipFill>
+          <a:blip r:embed="rId6">
+            <a:extLst>
+              <a:ext uri="{28A0092B-C50C-407E-A947-70E740481C1C}">
+                <a14:useLocalDpi xmlns:a14="http://schemas.microsoft.com/office/drawing/2010/main" val="0"/>
+              </a:ext>
+            </a:extLst>
+          </a:blip>
+          <a:srcRect/>
+          <a:stretch>
+            <a:fillRect/>
+          </a:stretch>
+        </p:blipFill>
+        <p:spPr bwMode="auto">
+          <a:xfrm>
+            <a:off x="2708610" y="3143029"/>
+            <a:ext cx="1708879" cy="1708879"/>
+          </a:xfrm>
+          <a:prstGeom prst="rect">
+            <a:avLst/>
+          </a:prstGeom>
+          <a:noFill/>
+          <a:extLst>
+            <a:ext uri="{909E8E84-426E-40DD-AFC4-6F175D3DCCD1}">
+              <a14:hiddenFill xmlns:a14="http://schemas.microsoft.com/office/drawing/2010/main">
+                <a:solidFill>
+                  <a:srgbClr val="FFFFFF"/>
+                </a:solidFill>
+              </a14:hiddenFill>
+            </a:ext>
+          </a:extLst>
+        </p:spPr>
+      </p:pic>
+      <p:pic>
+        <p:nvPicPr>
+          <p:cNvPr id="1030" name="Picture 6" descr="Roteador Wi-Fi Ícone - Download Grátis, PNG e Vetores">
+            <a:extLst>
+              <a:ext uri="{FF2B5EF4-FFF2-40B4-BE49-F238E27FC236}">
+                <a16:creationId xmlns:a16="http://schemas.microsoft.com/office/drawing/2014/main" id="{7A8BDA75-8082-4131-8F58-CCE859769CBD}"/>
+              </a:ext>
+            </a:extLst>
+          </p:cNvPr>
+          <p:cNvPicPr>
+            <a:picLocks noChangeAspect="1" noChangeArrowheads="1"/>
+          </p:cNvPicPr>
+          <p:nvPr/>
+        </p:nvPicPr>
+        <p:blipFill rotWithShape="1">
+          <a:blip r:embed="rId7">
+            <a:extLst>
+              <a:ext uri="{28A0092B-C50C-407E-A947-70E740481C1C}">
+                <a14:useLocalDpi xmlns:a14="http://schemas.microsoft.com/office/drawing/2010/main" val="0"/>
+              </a:ext>
+            </a:extLst>
+          </a:blip>
+          <a:srcRect r="5484" b="5242"/>
+          <a:stretch/>
+        </p:blipFill>
+        <p:spPr bwMode="auto">
+          <a:xfrm>
+            <a:off x="2708612" y="2809952"/>
+            <a:ext cx="742512" cy="744410"/>
+          </a:xfrm>
+          <a:prstGeom prst="rect">
+            <a:avLst/>
+          </a:prstGeom>
+          <a:noFill/>
+          <a:extLst>
+            <a:ext uri="{909E8E84-426E-40DD-AFC4-6F175D3DCCD1}">
+              <a14:hiddenFill xmlns:a14="http://schemas.microsoft.com/office/drawing/2010/main">
+                <a:solidFill>
+                  <a:srgbClr val="FFFFFF"/>
+                </a:solidFill>
+              </a14:hiddenFill>
+            </a:ext>
+          </a:extLst>
+        </p:spPr>
+      </p:pic>
+      <p:pic>
+        <p:nvPicPr>
+          <p:cNvPr id="1032" name="Picture 8" descr="ícone Servidor Livre de WHCompare Isometric Web Hosting &amp; Servers">
+            <a:extLst>
+              <a:ext uri="{FF2B5EF4-FFF2-40B4-BE49-F238E27FC236}">
+                <a16:creationId xmlns:a16="http://schemas.microsoft.com/office/drawing/2014/main" id="{CBDCF82D-42C4-4EB5-BDEF-78695D8EACC1}"/>
+              </a:ext>
+            </a:extLst>
+          </p:cNvPr>
+          <p:cNvPicPr>
+            <a:picLocks noChangeAspect="1" noChangeArrowheads="1"/>
+          </p:cNvPicPr>
+          <p:nvPr/>
+        </p:nvPicPr>
+        <p:blipFill>
+          <a:blip r:embed="rId8">
+            <a:extLst>
+              <a:ext uri="{28A0092B-C50C-407E-A947-70E740481C1C}">
+                <a14:useLocalDpi xmlns:a14="http://schemas.microsoft.com/office/drawing/2010/main" val="0"/>
+              </a:ext>
+            </a:extLst>
+          </a:blip>
+          <a:srcRect/>
+          <a:stretch>
+            <a:fillRect/>
+          </a:stretch>
+        </p:blipFill>
+        <p:spPr bwMode="auto">
+          <a:xfrm>
+            <a:off x="4941316" y="4759790"/>
+            <a:ext cx="2190327" cy="2190327"/>
+          </a:xfrm>
+          <a:prstGeom prst="rect">
+            <a:avLst/>
+          </a:prstGeom>
+          <a:noFill/>
+          <a:extLst>
+            <a:ext uri="{909E8E84-426E-40DD-AFC4-6F175D3DCCD1}">
+              <a14:hiddenFill xmlns:a14="http://schemas.microsoft.com/office/drawing/2010/main">
+                <a:solidFill>
+                  <a:srgbClr val="FFFFFF"/>
+                </a:solidFill>
+              </a14:hiddenFill>
+            </a:ext>
+          </a:extLst>
+        </p:spPr>
+      </p:pic>
+      <p:pic>
+        <p:nvPicPr>
+          <p:cNvPr id="1034" name="Picture 10" descr="Person using computer icon vector illustration design.">
+            <a:extLst>
+              <a:ext uri="{FF2B5EF4-FFF2-40B4-BE49-F238E27FC236}">
+                <a16:creationId xmlns:a16="http://schemas.microsoft.com/office/drawing/2014/main" id="{54807AD0-A037-46D2-9142-5A86027BD3DE}"/>
+              </a:ext>
+            </a:extLst>
+          </p:cNvPr>
+          <p:cNvPicPr>
+            <a:picLocks noChangeAspect="1" noChangeArrowheads="1"/>
+          </p:cNvPicPr>
+          <p:nvPr/>
+        </p:nvPicPr>
+        <p:blipFill rotWithShape="1">
+          <a:blip r:embed="rId9">
+            <a:extLst>
+              <a:ext uri="{28A0092B-C50C-407E-A947-70E740481C1C}">
+                <a14:useLocalDpi xmlns:a14="http://schemas.microsoft.com/office/drawing/2010/main" val="0"/>
+              </a:ext>
+            </a:extLst>
+          </a:blip>
+          <a:srcRect b="20960"/>
+          <a:stretch/>
+        </p:blipFill>
+        <p:spPr bwMode="auto">
+          <a:xfrm>
+            <a:off x="7774512" y="2947883"/>
+            <a:ext cx="1940641" cy="1661705"/>
+          </a:xfrm>
+          <a:prstGeom prst="rect">
+            <a:avLst/>
+          </a:prstGeom>
+          <a:noFill/>
+          <a:extLst>
+            <a:ext uri="{909E8E84-426E-40DD-AFC4-6F175D3DCCD1}">
+              <a14:hiddenFill xmlns:a14="http://schemas.microsoft.com/office/drawing/2010/main">
+                <a:solidFill>
+                  <a:srgbClr val="FFFFFF"/>
+                </a:solidFill>
+              </a14:hiddenFill>
+            </a:ext>
+          </a:extLst>
+        </p:spPr>
+      </p:pic>
+      <p:pic>
+        <p:nvPicPr>
+          <p:cNvPr id="1036" name="Picture 12" descr="computer, desktop, laptop, mac, monitor, pc, screen icon | Conjunto de  ícones, Conjunto de">
+            <a:extLst>
+              <a:ext uri="{FF2B5EF4-FFF2-40B4-BE49-F238E27FC236}">
+                <a16:creationId xmlns:a16="http://schemas.microsoft.com/office/drawing/2014/main" id="{207611DD-ED0F-4EF6-86BE-D157312D68E1}"/>
+              </a:ext>
+            </a:extLst>
+          </p:cNvPr>
+          <p:cNvPicPr>
+            <a:picLocks noChangeAspect="1" noChangeArrowheads="1"/>
+          </p:cNvPicPr>
+          <p:nvPr/>
+        </p:nvPicPr>
+        <p:blipFill>
+          <a:blip r:embed="rId10">
+            <a:extLst>
+              <a:ext uri="{28A0092B-C50C-407E-A947-70E740481C1C}">
+                <a14:useLocalDpi xmlns:a14="http://schemas.microsoft.com/office/drawing/2010/main" val="0"/>
+              </a:ext>
+            </a:extLst>
+          </a:blip>
+          <a:srcRect/>
+          <a:stretch>
+            <a:fillRect/>
+          </a:stretch>
+        </p:blipFill>
+        <p:spPr bwMode="auto">
+          <a:xfrm>
+            <a:off x="9560874" y="2906200"/>
+            <a:ext cx="2190327" cy="1981045"/>
+          </a:xfrm>
+          <a:prstGeom prst="rect">
+            <a:avLst/>
+          </a:prstGeom>
+          <a:noFill/>
+          <a:extLst>
+            <a:ext uri="{909E8E84-426E-40DD-AFC4-6F175D3DCCD1}">
+              <a14:hiddenFill xmlns:a14="http://schemas.microsoft.com/office/drawing/2010/main">
+                <a:solidFill>
+                  <a:srgbClr val="FFFFFF"/>
+                </a:solidFill>
+              </a14:hiddenFill>
+            </a:ext>
+          </a:extLst>
+        </p:spPr>
+      </p:pic>
+      <p:sp>
+        <p:nvSpPr>
+          <p:cNvPr id="7" name="CaixaDeTexto 6">
+            <a:extLst>
+              <a:ext uri="{FF2B5EF4-FFF2-40B4-BE49-F238E27FC236}">
+                <a16:creationId xmlns:a16="http://schemas.microsoft.com/office/drawing/2014/main" id="{C3D9AF88-2C98-4553-B0A1-E0B2F86C0658}"/>
+              </a:ext>
+            </a:extLst>
+          </p:cNvPr>
+          <p:cNvSpPr txBox="1"/>
+          <p:nvPr/>
+        </p:nvSpPr>
+        <p:spPr>
+          <a:xfrm>
+            <a:off x="9674157" y="3169442"/>
+            <a:ext cx="2077044" cy="830997"/>
+          </a:xfrm>
+          <a:prstGeom prst="rect">
+            <a:avLst/>
+          </a:prstGeom>
+          <a:noFill/>
+        </p:spPr>
+        <p:txBody>
+          <a:bodyPr wrap="square" rtlCol="0">
+            <a:spAutoFit/>
+          </a:bodyPr>
+          <a:lstStyle/>
+          <a:p>
+            <a:r>
+              <a:rPr lang="pt-BR" sz="1600" b="1" dirty="0">
+                <a:latin typeface="Arial" panose="020B0604020202020204" pitchFamily="34" charset="0"/>
+                <a:cs typeface="Arial" panose="020B0604020202020204" pitchFamily="34" charset="0"/>
+              </a:rPr>
+              <a:t>Sensor 3 detectou um possível vazamento</a:t>
+            </a:r>
+          </a:p>
+        </p:txBody>
+      </p:sp>
+      <p:sp>
+        <p:nvSpPr>
+          <p:cNvPr id="12" name="Seta: Dobrada 11">
+            <a:extLst>
+              <a:ext uri="{FF2B5EF4-FFF2-40B4-BE49-F238E27FC236}">
+                <a16:creationId xmlns:a16="http://schemas.microsoft.com/office/drawing/2014/main" id="{4366ED66-17D2-466D-B291-EE6FBF8C3D21}"/>
+              </a:ext>
+            </a:extLst>
+          </p:cNvPr>
+          <p:cNvSpPr/>
+          <p:nvPr/>
+        </p:nvSpPr>
+        <p:spPr>
+          <a:xfrm>
+            <a:off x="1012728" y="3308498"/>
+            <a:ext cx="1459034" cy="1377939"/>
+          </a:xfrm>
+          <a:prstGeom prst="bentArrow">
+            <a:avLst/>
+          </a:prstGeom>
+          <a:solidFill>
+            <a:schemeClr val="tx1"/>
+          </a:solidFill>
+          <a:ln w="28575">
+            <a:solidFill>
+              <a:schemeClr val="accent1"/>
+            </a:solidFill>
+          </a:ln>
+        </p:spPr>
+        <p:style>
+          <a:lnRef idx="2">
+            <a:schemeClr val="accent1">
+              <a:shade val="50000"/>
+            </a:schemeClr>
+          </a:lnRef>
+          <a:fillRef idx="1">
+            <a:schemeClr val="accent1"/>
+          </a:fillRef>
+          <a:effectRef idx="0">
+            <a:schemeClr val="accent1"/>
+          </a:effectRef>
+          <a:fontRef idx="minor">
+            <a:schemeClr val="lt1"/>
+          </a:fontRef>
+        </p:style>
+        <p:txBody>
+          <a:bodyPr rtlCol="0" anchor="ctr"/>
+          <a:lstStyle/>
+          <a:p>
+            <a:pPr algn="ctr"/>
+            <a:endParaRPr lang="pt-BR">
+              <a:solidFill>
+                <a:schemeClr val="tx1"/>
+              </a:solidFill>
+            </a:endParaRPr>
+          </a:p>
+        </p:txBody>
+      </p:sp>
+      <p:sp>
+        <p:nvSpPr>
+          <p:cNvPr id="27" name="Seta: Dobrada 26">
+            <a:extLst>
+              <a:ext uri="{FF2B5EF4-FFF2-40B4-BE49-F238E27FC236}">
+                <a16:creationId xmlns:a16="http://schemas.microsoft.com/office/drawing/2014/main" id="{E1B164E1-E2B1-4315-87E5-DFE21A4AE3F1}"/>
+              </a:ext>
+            </a:extLst>
+          </p:cNvPr>
+          <p:cNvSpPr/>
+          <p:nvPr/>
+        </p:nvSpPr>
+        <p:spPr>
+          <a:xfrm rot="5400000">
+            <a:off x="4933089" y="3202886"/>
+            <a:ext cx="1258227" cy="1708879"/>
+          </a:xfrm>
+          <a:prstGeom prst="bentArrow">
+            <a:avLst>
+              <a:gd name="adj1" fmla="val 25000"/>
+              <a:gd name="adj2" fmla="val 25535"/>
+              <a:gd name="adj3" fmla="val 25000"/>
+              <a:gd name="adj4" fmla="val 43750"/>
+            </a:avLst>
+          </a:prstGeom>
+          <a:solidFill>
+            <a:schemeClr val="tx1"/>
+          </a:solidFill>
+          <a:ln w="28575">
+            <a:solidFill>
+              <a:schemeClr val="accent1"/>
+            </a:solidFill>
+          </a:ln>
+        </p:spPr>
+        <p:style>
+          <a:lnRef idx="2">
+            <a:schemeClr val="accent1">
+              <a:shade val="50000"/>
+            </a:schemeClr>
+          </a:lnRef>
+          <a:fillRef idx="1">
+            <a:schemeClr val="accent1"/>
+          </a:fillRef>
+          <a:effectRef idx="0">
+            <a:schemeClr val="accent1"/>
+          </a:effectRef>
+          <a:fontRef idx="minor">
+            <a:schemeClr val="lt1"/>
+          </a:fontRef>
+        </p:style>
+        <p:txBody>
+          <a:bodyPr rtlCol="0" anchor="ctr"/>
+          <a:lstStyle/>
+          <a:p>
+            <a:pPr algn="ctr"/>
+            <a:endParaRPr lang="pt-BR">
+              <a:solidFill>
+                <a:schemeClr val="tx1"/>
+              </a:solidFill>
+            </a:endParaRPr>
+          </a:p>
+        </p:txBody>
+      </p:sp>
+      <p:sp>
+        <p:nvSpPr>
+          <p:cNvPr id="30" name="Seta: Dobrada 29">
+            <a:extLst>
+              <a:ext uri="{FF2B5EF4-FFF2-40B4-BE49-F238E27FC236}">
+                <a16:creationId xmlns:a16="http://schemas.microsoft.com/office/drawing/2014/main" id="{CDD5915B-A970-438D-BF62-32FB5A19344B}"/>
+              </a:ext>
+            </a:extLst>
+          </p:cNvPr>
+          <p:cNvSpPr/>
+          <p:nvPr/>
+        </p:nvSpPr>
+        <p:spPr>
+          <a:xfrm rot="5400000" flipH="1">
+            <a:off x="7666041" y="4223741"/>
+            <a:ext cx="1360433" cy="2429231"/>
+          </a:xfrm>
+          <a:prstGeom prst="bentArrow">
+            <a:avLst>
+              <a:gd name="adj1" fmla="val 25000"/>
+              <a:gd name="adj2" fmla="val 25535"/>
+              <a:gd name="adj3" fmla="val 25000"/>
+              <a:gd name="adj4" fmla="val 43750"/>
+            </a:avLst>
+          </a:prstGeom>
+          <a:solidFill>
+            <a:schemeClr val="tx1"/>
+          </a:solidFill>
+          <a:ln w="28575">
+            <a:solidFill>
+              <a:schemeClr val="accent1"/>
+            </a:solidFill>
+          </a:ln>
+        </p:spPr>
+        <p:style>
+          <a:lnRef idx="2">
+            <a:schemeClr val="accent1">
+              <a:shade val="50000"/>
+            </a:schemeClr>
+          </a:lnRef>
+          <a:fillRef idx="1">
+            <a:schemeClr val="accent1"/>
+          </a:fillRef>
+          <a:effectRef idx="0">
+            <a:schemeClr val="accent1"/>
+          </a:effectRef>
+          <a:fontRef idx="minor">
+            <a:schemeClr val="lt1"/>
+          </a:fontRef>
+        </p:style>
+        <p:txBody>
+          <a:bodyPr rtlCol="0" anchor="ctr"/>
+          <a:lstStyle/>
+          <a:p>
+            <a:pPr algn="ctr"/>
+            <a:endParaRPr lang="pt-BR">
+              <a:solidFill>
+                <a:schemeClr val="tx1"/>
+              </a:solidFill>
+            </a:endParaRPr>
+          </a:p>
+        </p:txBody>
+      </p:sp>
+      <p:cxnSp>
+        <p:nvCxnSpPr>
+          <p:cNvPr id="18" name="Conector reto 17">
+            <a:extLst>
+              <a:ext uri="{FF2B5EF4-FFF2-40B4-BE49-F238E27FC236}">
+                <a16:creationId xmlns:a16="http://schemas.microsoft.com/office/drawing/2014/main" id="{6105CB52-E11F-4E14-B6A3-6554486FA74A}"/>
+              </a:ext>
+            </a:extLst>
+          </p:cNvPr>
+          <p:cNvCxnSpPr/>
+          <p:nvPr/>
+        </p:nvCxnSpPr>
+        <p:spPr>
+          <a:xfrm>
+            <a:off x="377585" y="2035278"/>
+            <a:ext cx="11436829" cy="0"/>
+          </a:xfrm>
+          <a:prstGeom prst="line">
+            <a:avLst/>
+          </a:prstGeom>
+          <a:ln>
+            <a:solidFill>
+              <a:schemeClr val="tx1"/>
+            </a:solidFill>
+          </a:ln>
+        </p:spPr>
+        <p:style>
+          <a:lnRef idx="3">
+            <a:schemeClr val="dk1"/>
+          </a:lnRef>
+          <a:fillRef idx="0">
+            <a:schemeClr val="dk1"/>
+          </a:fillRef>
+          <a:effectRef idx="2">
+            <a:schemeClr val="dk1"/>
+          </a:effectRef>
+          <a:fontRef idx="minor">
+            <a:schemeClr val="tx1"/>
+          </a:fontRef>
+        </p:style>
+      </p:cxnSp>
+      <p:pic>
+        <p:nvPicPr>
+          <p:cNvPr id="33" name="Imagem 32">
+            <a:extLst>
+              <a:ext uri="{FF2B5EF4-FFF2-40B4-BE49-F238E27FC236}">
+                <a16:creationId xmlns:a16="http://schemas.microsoft.com/office/drawing/2014/main" id="{B7DA62BD-20DE-46B7-A3D7-DC7738701FEC}"/>
+              </a:ext>
+            </a:extLst>
+          </p:cNvPr>
+          <p:cNvPicPr>
+            <a:picLocks noChangeAspect="1"/>
+          </p:cNvPicPr>
+          <p:nvPr/>
+        </p:nvPicPr>
+        <p:blipFill>
+          <a:blip r:embed="rId11"/>
+          <a:stretch>
+            <a:fillRect/>
+          </a:stretch>
+        </p:blipFill>
+        <p:spPr>
+          <a:xfrm>
+            <a:off x="53894" y="35169"/>
+            <a:ext cx="1035488" cy="1035488"/>
+          </a:xfrm>
+          <a:prstGeom prst="rect">
+            <a:avLst/>
+          </a:prstGeom>
+        </p:spPr>
+      </p:pic>
+    </p:spTree>
+    <p:extLst>
+      <p:ext uri="{BB962C8B-B14F-4D97-AF65-F5344CB8AC3E}">
+        <p14:creationId xmlns:p14="http://schemas.microsoft.com/office/powerpoint/2010/main" val="1654437090"/>
+      </p:ext>
+    </p:extLst>
+  </p:cSld>
+  <p:clrMapOvr>
+    <a:masterClrMapping/>
+  </p:clrMapOvr>
+</p:sld>
+</file>
+
+<file path=ppt/slides/slide7.xml><?xml version="1.0" encoding="utf-8"?>
+<p:sld xmlns:a="http://schemas.openxmlformats.org/drawingml/2006/main" xmlns:r="http://schemas.openxmlformats.org/officeDocument/2006/relationships" xmlns:p="http://schemas.openxmlformats.org/presentationml/2006/main">
+  <p:cSld>
+    <p:bg>
+      <p:bgPr>
+        <a:solidFill>
+          <a:schemeClr val="bg1"/>
+        </a:solidFill>
+        <a:effectLst/>
+      </p:bgPr>
+    </p:bg>
+    <p:spTree>
+      <p:nvGrpSpPr>
+        <p:cNvPr id="1" name=""/>
+        <p:cNvGrpSpPr/>
+        <p:nvPr/>
+      </p:nvGrpSpPr>
+      <p:grpSpPr>
+        <a:xfrm>
+          <a:off x="0" y="0"/>
+          <a:ext cx="0" cy="0"/>
+          <a:chOff x="0" y="0"/>
+          <a:chExt cx="0" cy="0"/>
+        </a:xfrm>
+      </p:grpSpPr>
+      <p:sp>
+        <p:nvSpPr>
+          <p:cNvPr id="12" name="Rectangle 11">
+            <a:extLst>
+              <a:ext uri="{FF2B5EF4-FFF2-40B4-BE49-F238E27FC236}">
+                <a16:creationId xmlns:a16="http://schemas.microsoft.com/office/drawing/2014/main" id="{EBF87945-A001-489F-9D9B-7D9435F0B9CA}"/>
+              </a:ext>
+              <a:ext uri="{C183D7F6-B498-43B3-948B-1728B52AA6E4}">
+                <adec:decorative xmlns:adec="http://schemas.microsoft.com/office/drawing/2017/decorative" val="1"/>
+              </a:ext>
+            </a:extLst>
+          </p:cNvPr>
+          <p:cNvSpPr>
+            <a:spLocks noGrp="1" noRot="1" noChangeAspect="1" noMove="1" noResize="1" noEditPoints="1" noAdjustHandles="1" noChangeArrowheads="1" noChangeShapeType="1" noTextEdit="1"/>
+          </p:cNvSpPr>
+          <p:nvPr>
+            <p:extLst>
+              <p:ext uri="{386F3935-93C4-4BCD-93E2-E3B085C9AB24}">
+                <p16:designElem xmlns:p16="http://schemas.microsoft.com/office/powerpoint/2015/main" val="1"/>
+              </p:ext>
+            </p:extLst>
+          </p:nvPr>
+        </p:nvSpPr>
+        <p:spPr>
+          <a:xfrm>
+            <a:off x="548639" y="347471"/>
+            <a:ext cx="11100816" cy="1801368"/>
+          </a:xfrm>
+          <a:prstGeom prst="rect">
+            <a:avLst/>
+          </a:prstGeom>
+          <a:solidFill>
+            <a:schemeClr val="accent5"/>
+          </a:solidFill>
+          <a:ln>
+            <a:noFill/>
+          </a:ln>
+        </p:spPr>
+        <p:style>
+          <a:lnRef idx="2">
+            <a:schemeClr val="accent1">
+              <a:shade val="50000"/>
+            </a:schemeClr>
+          </a:lnRef>
+          <a:fillRef idx="1">
+            <a:schemeClr val="accent1"/>
+          </a:fillRef>
+          <a:effectRef idx="0">
+            <a:schemeClr val="accent1"/>
+          </a:effectRef>
+          <a:fontRef idx="minor">
+            <a:schemeClr val="lt1"/>
+          </a:fontRef>
+        </p:style>
+        <p:txBody>
+          <a:bodyPr rtlCol="0" anchor="ctr"/>
+          <a:lstStyle/>
+          <a:p>
+            <a:pPr algn="ctr"/>
+            <a:endParaRPr lang="en-US"/>
+          </a:p>
+        </p:txBody>
+      </p:sp>
+      <p:sp>
+        <p:nvSpPr>
+          <p:cNvPr id="2" name="Título 1">
+            <a:extLst>
+              <a:ext uri="{FF2B5EF4-FFF2-40B4-BE49-F238E27FC236}">
+                <a16:creationId xmlns:a16="http://schemas.microsoft.com/office/drawing/2014/main" id="{3A580CA3-C4A8-48EE-8329-D7B6949B6EF8}"/>
+              </a:ext>
+            </a:extLst>
+          </p:cNvPr>
+          <p:cNvSpPr>
+            <a:spLocks noGrp="1"/>
+          </p:cNvSpPr>
+          <p:nvPr>
+            <p:ph type="title"/>
+          </p:nvPr>
+        </p:nvSpPr>
+        <p:spPr>
+          <a:xfrm>
+            <a:off x="838200" y="585216"/>
+            <a:ext cx="10515600" cy="1325563"/>
+          </a:xfrm>
+        </p:spPr>
+        <p:txBody>
+          <a:bodyPr vert="horz" lIns="91440" tIns="45720" rIns="91440" bIns="45720" rtlCol="0" anchor="ctr">
+            <a:normAutofit/>
+          </a:bodyPr>
+          <a:lstStyle/>
+          <a:p>
+            <a:r>
+              <a:rPr lang="en-US">
+                <a:solidFill>
+                  <a:srgbClr val="FFFFFF"/>
+                </a:solidFill>
+              </a:rPr>
+              <a:t>Backlog</a:t>
+            </a:r>
+          </a:p>
+        </p:txBody>
+      </p:sp>
+      <p:pic>
+        <p:nvPicPr>
+          <p:cNvPr id="7" name="Imagem 6">
+            <a:extLst>
+              <a:ext uri="{FF2B5EF4-FFF2-40B4-BE49-F238E27FC236}">
+                <a16:creationId xmlns:a16="http://schemas.microsoft.com/office/drawing/2014/main" id="{E462C9DF-18F2-48EE-AA9E-93A3426BA2F5}"/>
+              </a:ext>
+            </a:extLst>
+          </p:cNvPr>
+          <p:cNvPicPr>
+            <a:picLocks noChangeAspect="1"/>
+          </p:cNvPicPr>
+          <p:nvPr/>
+        </p:nvPicPr>
+        <p:blipFill rotWithShape="1">
+          <a:blip r:embed="rId2"/>
+          <a:srcRect r="4159" b="-3"/>
+          <a:stretch/>
+        </p:blipFill>
+        <p:spPr>
+          <a:xfrm>
+            <a:off x="841248" y="2516777"/>
+            <a:ext cx="6236208" cy="3660185"/>
+          </a:xfrm>
+          <a:prstGeom prst="rect">
+            <a:avLst/>
+          </a:prstGeom>
+        </p:spPr>
+      </p:pic>
+      <p:sp>
+        <p:nvSpPr>
+          <p:cNvPr id="5" name="Retângulo 4">
+            <a:extLst>
+              <a:ext uri="{FF2B5EF4-FFF2-40B4-BE49-F238E27FC236}">
+                <a16:creationId xmlns:a16="http://schemas.microsoft.com/office/drawing/2014/main" id="{2842D2F7-1F0E-4187-BF45-586651DFA6B4}"/>
+              </a:ext>
+            </a:extLst>
+          </p:cNvPr>
+          <p:cNvSpPr/>
+          <p:nvPr/>
+        </p:nvSpPr>
+        <p:spPr>
+          <a:xfrm>
+            <a:off x="7546848" y="2516777"/>
+            <a:ext cx="3803904" cy="3660185"/>
+          </a:xfrm>
+          <a:prstGeom prst="rect">
+            <a:avLst/>
+          </a:prstGeom>
+        </p:spPr>
+        <p:txBody>
+          <a:bodyPr vert="horz" lIns="91440" tIns="45720" rIns="91440" bIns="45720" rtlCol="0" anchor="ctr">
+            <a:normAutofit/>
+          </a:bodyPr>
+          <a:lstStyle/>
+          <a:p>
+            <a:pPr marL="285750" indent="-228600">
+              <a:lnSpc>
+                <a:spcPct val="90000"/>
+              </a:lnSpc>
+              <a:spcAft>
+                <a:spcPts val="600"/>
+              </a:spcAft>
+              <a:buFont typeface="Arial" panose="020B0604020202020204" pitchFamily="34" charset="0"/>
+              <a:buChar char="•"/>
+            </a:pPr>
+            <a:r>
+              <a:rPr lang="en-US" sz="1900">
+                <a:effectLst>
+                  <a:outerShdw blurRad="38100" dist="38100" dir="2700000" algn="tl">
+                    <a:srgbClr val="000000">
+                      <a:alpha val="43137"/>
+                    </a:srgbClr>
+                  </a:outerShdw>
+                </a:effectLst>
+              </a:rPr>
+              <a:t>Backlog da Página Web</a:t>
+            </a:r>
+            <a:r>
+              <a:rPr lang="en-US" sz="1900"/>
+              <a:t>: </a:t>
+            </a:r>
+            <a:r>
+              <a:rPr lang="en-US" sz="1900">
+                <a:hlinkClick r:id="rId3"/>
+              </a:rPr>
+              <a:t>https://trello.com/b/gkREIOhE/pagina-web-institucional#</a:t>
+            </a:r>
+            <a:endParaRPr lang="en-US" sz="1900"/>
+          </a:p>
+          <a:p>
+            <a:pPr marL="285750" indent="-228600">
+              <a:lnSpc>
+                <a:spcPct val="90000"/>
+              </a:lnSpc>
+              <a:spcAft>
+                <a:spcPts val="600"/>
+              </a:spcAft>
+              <a:buFont typeface="Arial" panose="020B0604020202020204" pitchFamily="34" charset="0"/>
+              <a:buChar char="•"/>
+            </a:pPr>
+            <a:endParaRPr lang="en-US" sz="1900"/>
+          </a:p>
+          <a:p>
+            <a:pPr marL="285750" indent="-228600">
+              <a:lnSpc>
+                <a:spcPct val="90000"/>
+              </a:lnSpc>
+              <a:spcAft>
+                <a:spcPts val="600"/>
+              </a:spcAft>
+              <a:buFont typeface="Arial" panose="020B0604020202020204" pitchFamily="34" charset="0"/>
+              <a:buChar char="•"/>
+            </a:pPr>
+            <a:r>
+              <a:rPr lang="en-US" sz="1900"/>
+              <a:t>Backlog do Banco de Dados: </a:t>
+            </a:r>
+            <a:r>
+              <a:rPr lang="en-US" sz="1900">
+                <a:hlinkClick r:id="rId4"/>
+              </a:rPr>
+              <a:t>https://trello.com/b/CPmBase7/banco-de-dados#</a:t>
+            </a:r>
+            <a:endParaRPr lang="en-US" sz="1900"/>
+          </a:p>
+          <a:p>
+            <a:pPr marL="285750" indent="-228600">
+              <a:lnSpc>
+                <a:spcPct val="90000"/>
+              </a:lnSpc>
+              <a:spcAft>
+                <a:spcPts val="600"/>
+              </a:spcAft>
+              <a:buFont typeface="Arial" panose="020B0604020202020204" pitchFamily="34" charset="0"/>
+              <a:buChar char="•"/>
+            </a:pPr>
+            <a:endParaRPr lang="en-US" sz="1900"/>
+          </a:p>
+          <a:p>
+            <a:pPr marL="285750" indent="-228600">
+              <a:lnSpc>
+                <a:spcPct val="90000"/>
+              </a:lnSpc>
+              <a:spcAft>
+                <a:spcPts val="600"/>
+              </a:spcAft>
+              <a:buFont typeface="Arial" panose="020B0604020202020204" pitchFamily="34" charset="0"/>
+              <a:buChar char="•"/>
+            </a:pPr>
+            <a:r>
+              <a:rPr lang="en-US" sz="1900"/>
+              <a:t>Backlog do Simulador de Sensores: </a:t>
+            </a:r>
+            <a:r>
+              <a:rPr lang="en-US" sz="1900">
+                <a:hlinkClick r:id="rId5"/>
+              </a:rPr>
+              <a:t>https://trello.com/b/rW7Jmab2/arduino-simulador-de-sensores#</a:t>
+            </a:r>
+            <a:endParaRPr lang="en-US" sz="1900"/>
+          </a:p>
+        </p:txBody>
+      </p:sp>
+    </p:spTree>
+    <p:extLst>
+      <p:ext uri="{BB962C8B-B14F-4D97-AF65-F5344CB8AC3E}">
+        <p14:creationId xmlns:p14="http://schemas.microsoft.com/office/powerpoint/2010/main" val="3726330790"/>
+      </p:ext>
+    </p:extLst>
+  </p:cSld>
+  <p:clrMapOvr>
+    <a:masterClrMapping/>
+  </p:clrMapOvr>
+</p:sld>
+</file>
+
+<file path=ppt/slides/slide8.xml><?xml version="1.0" encoding="utf-8"?>
+<p:sld xmlns:a="http://schemas.openxmlformats.org/drawingml/2006/main" xmlns:r="http://schemas.openxmlformats.org/officeDocument/2006/relationships" xmlns:p="http://schemas.openxmlformats.org/presentationml/2006/main">
+  <p:cSld>
     <p:bg>
       <p:bgPr>
         <a:solidFill>
@@ -7734,7 +9736,7 @@
 </p:sld>
 </file>
 
-<file path=ppt/slides/slide7.xml><?xml version="1.0" encoding="utf-8"?>
+<file path=ppt/slides/slide9.xml><?xml version="1.0" encoding="utf-8"?>
 <p:sld xmlns:a="http://schemas.openxmlformats.org/drawingml/2006/main" xmlns:r="http://schemas.openxmlformats.org/officeDocument/2006/relationships" xmlns:p="http://schemas.openxmlformats.org/presentationml/2006/main">
   <p:cSld>
     <p:spTree>
@@ -7849,865 +9851,12 @@
           </a:fontRef>
         </p:style>
       </p:cxnSp>
-    </p:spTree>
-    <p:extLst>
-      <p:ext uri="{BB962C8B-B14F-4D97-AF65-F5344CB8AC3E}">
-        <p14:creationId xmlns:p14="http://schemas.microsoft.com/office/powerpoint/2010/main" val="1663262286"/>
-      </p:ext>
-    </p:extLst>
-  </p:cSld>
-  <p:clrMapOvr>
-    <a:masterClrMapping/>
-  </p:clrMapOvr>
-</p:sld>
-</file>
-
-<file path=ppt/slides/slide8.xml><?xml version="1.0" encoding="utf-8"?>
-<p:sld xmlns:a="http://schemas.openxmlformats.org/drawingml/2006/main" xmlns:r="http://schemas.openxmlformats.org/officeDocument/2006/relationships" xmlns:p="http://schemas.openxmlformats.org/presentationml/2006/main">
-  <p:cSld>
-    <p:spTree>
-      <p:nvGrpSpPr>
-        <p:cNvPr id="1" name=""/>
-        <p:cNvGrpSpPr/>
-        <p:nvPr/>
-      </p:nvGrpSpPr>
-      <p:grpSpPr>
-        <a:xfrm>
-          <a:off x="0" y="0"/>
-          <a:ext cx="0" cy="0"/>
-          <a:chOff x="0" y="0"/>
-          <a:chExt cx="0" cy="0"/>
-        </a:xfrm>
-      </p:grpSpPr>
       <p:pic>
         <p:nvPicPr>
-          <p:cNvPr id="2" name="Imagem 1" descr="Tela de celular com texto preto sobre fundo branco&#10;&#10;Descrição gerada automaticamente">
-            <a:extLst>
-              <a:ext uri="{FF2B5EF4-FFF2-40B4-BE49-F238E27FC236}">
-                <a16:creationId xmlns:a16="http://schemas.microsoft.com/office/drawing/2014/main" id="{88621860-DC98-495A-8724-3A4CEB09131B}"/>
-              </a:ext>
-            </a:extLst>
-          </p:cNvPr>
-          <p:cNvPicPr>
-            <a:picLocks noChangeAspect="1"/>
-          </p:cNvPicPr>
-          <p:nvPr/>
-        </p:nvPicPr>
-        <p:blipFill rotWithShape="1">
-          <a:blip r:embed="rId2">
-            <a:extLst>
-              <a:ext uri="{28A0092B-C50C-407E-A947-70E740481C1C}">
-                <a14:useLocalDpi xmlns:a14="http://schemas.microsoft.com/office/drawing/2010/main" val="0"/>
-              </a:ext>
-            </a:extLst>
-          </a:blip>
-          <a:srcRect l="15616" r="-1" b="-1"/>
-          <a:stretch/>
-        </p:blipFill>
-        <p:spPr>
-          <a:xfrm>
-            <a:off x="321731" y="557189"/>
-            <a:ext cx="5668684" cy="5743618"/>
-          </a:xfrm>
-          <a:prstGeom prst="rect">
-            <a:avLst/>
-          </a:prstGeom>
-        </p:spPr>
-      </p:pic>
-      <p:pic>
-        <p:nvPicPr>
-          <p:cNvPr id="3" name="Imagem 2" descr="Tela de computador com texto preto sobre fundo branco&#10;&#10;Descrição gerada automaticamente">
-            <a:extLst>
-              <a:ext uri="{FF2B5EF4-FFF2-40B4-BE49-F238E27FC236}">
-                <a16:creationId xmlns:a16="http://schemas.microsoft.com/office/drawing/2014/main" id="{BB301F1E-1159-49B4-AA43-82E455F0FC41}"/>
-              </a:ext>
-            </a:extLst>
-          </p:cNvPr>
-          <p:cNvPicPr/>
-          <p:nvPr/>
-        </p:nvPicPr>
-        <p:blipFill rotWithShape="1">
-          <a:blip r:embed="rId3" cstate="print">
-            <a:extLst>
-              <a:ext uri="{28A0092B-C50C-407E-A947-70E740481C1C}">
-                <a14:useLocalDpi xmlns:a14="http://schemas.microsoft.com/office/drawing/2010/main" val="0"/>
-              </a:ext>
-            </a:extLst>
-          </a:blip>
-          <a:srcRect l="11336" r="14560" b="-2"/>
-          <a:stretch/>
-        </p:blipFill>
-        <p:spPr bwMode="auto">
-          <a:xfrm>
-            <a:off x="6195375" y="557189"/>
-            <a:ext cx="5674893" cy="5743618"/>
-          </a:xfrm>
-          <a:prstGeom prst="rect">
-            <a:avLst/>
-          </a:prstGeom>
-          <a:noFill/>
-        </p:spPr>
-      </p:pic>
-      <p:cxnSp>
-        <p:nvCxnSpPr>
-          <p:cNvPr id="5" name="Conector reto 4">
-            <a:extLst>
-              <a:ext uri="{FF2B5EF4-FFF2-40B4-BE49-F238E27FC236}">
-                <a16:creationId xmlns:a16="http://schemas.microsoft.com/office/drawing/2014/main" id="{D90523EA-AF65-44BB-8210-EBEF2EABF735}"/>
-              </a:ext>
-            </a:extLst>
-          </p:cNvPr>
-          <p:cNvCxnSpPr>
-            <a:cxnSpLocks/>
-          </p:cNvCxnSpPr>
-          <p:nvPr/>
-        </p:nvCxnSpPr>
-        <p:spPr>
-          <a:xfrm>
-            <a:off x="6096000" y="330200"/>
-            <a:ext cx="0" cy="6134100"/>
-          </a:xfrm>
-          <a:prstGeom prst="line">
-            <a:avLst/>
-          </a:prstGeom>
-          <a:ln/>
-        </p:spPr>
-        <p:style>
-          <a:lnRef idx="3">
-            <a:schemeClr val="accent1"/>
-          </a:lnRef>
-          <a:fillRef idx="0">
-            <a:schemeClr val="accent1"/>
-          </a:fillRef>
-          <a:effectRef idx="2">
-            <a:schemeClr val="accent1"/>
-          </a:effectRef>
-          <a:fontRef idx="minor">
-            <a:schemeClr val="tx1"/>
-          </a:fontRef>
-        </p:style>
-      </p:cxnSp>
-    </p:spTree>
-    <p:extLst>
-      <p:ext uri="{BB962C8B-B14F-4D97-AF65-F5344CB8AC3E}">
-        <p14:creationId xmlns:p14="http://schemas.microsoft.com/office/powerpoint/2010/main" val="1307777368"/>
-      </p:ext>
-    </p:extLst>
-  </p:cSld>
-  <p:clrMapOvr>
-    <a:masterClrMapping/>
-  </p:clrMapOvr>
-</p:sld>
-</file>
-
-<file path=ppt/slides/slide9.xml><?xml version="1.0" encoding="utf-8"?>
-<p:sld xmlns:a="http://schemas.openxmlformats.org/drawingml/2006/main" xmlns:r="http://schemas.openxmlformats.org/officeDocument/2006/relationships" xmlns:p="http://schemas.openxmlformats.org/presentationml/2006/main">
-  <p:cSld>
-    <p:spTree>
-      <p:nvGrpSpPr>
-        <p:cNvPr id="1" name=""/>
-        <p:cNvGrpSpPr/>
-        <p:nvPr/>
-      </p:nvGrpSpPr>
-      <p:grpSpPr>
-        <a:xfrm>
-          <a:off x="0" y="0"/>
-          <a:ext cx="0" cy="0"/>
-          <a:chOff x="0" y="0"/>
-          <a:chExt cx="0" cy="0"/>
-        </a:xfrm>
-      </p:grpSpPr>
-      <p:sp>
-        <p:nvSpPr>
-          <p:cNvPr id="2" name="Título 1">
-            <a:extLst>
-              <a:ext uri="{FF2B5EF4-FFF2-40B4-BE49-F238E27FC236}">
-                <a16:creationId xmlns:a16="http://schemas.microsoft.com/office/drawing/2014/main" id="{81717266-6AEC-4E54-ABDD-4B3A2718C4F3}"/>
-              </a:ext>
-            </a:extLst>
-          </p:cNvPr>
-          <p:cNvSpPr>
-            <a:spLocks noGrp="1"/>
-          </p:cNvSpPr>
-          <p:nvPr>
-            <p:ph type="title"/>
-          </p:nvPr>
-        </p:nvSpPr>
-        <p:spPr>
-          <a:xfrm>
-            <a:off x="838199" y="708890"/>
-            <a:ext cx="10515600" cy="1325563"/>
-          </a:xfrm>
-        </p:spPr>
-        <p:txBody>
-          <a:bodyPr>
-            <a:normAutofit/>
-          </a:bodyPr>
-          <a:lstStyle/>
-          <a:p>
-            <a:pPr algn="ctr"/>
-            <a:r>
-              <a:rPr lang="pt-BR" sz="3700" dirty="0">
-                <a:latin typeface="Arial" panose="020B0604020202020204" pitchFamily="34" charset="0"/>
-                <a:cs typeface="Arial" panose="020B0604020202020204" pitchFamily="34" charset="0"/>
-              </a:rPr>
-              <a:t>Onde os dados são armazenados?</a:t>
-            </a:r>
-          </a:p>
-        </p:txBody>
-      </p:sp>
-      <p:pic>
-        <p:nvPicPr>
-          <p:cNvPr id="4" name="Picture 2" descr="Waste Water Treatment Leakage Broke Svg Png Icon Free Download (#569149) -  OnlineWebFonts.COM">
-            <a:extLst>
-              <a:ext uri="{FF2B5EF4-FFF2-40B4-BE49-F238E27FC236}">
-                <a16:creationId xmlns:a16="http://schemas.microsoft.com/office/drawing/2014/main" id="{A9027475-A512-4FFC-B95F-6730DF59B3DE}"/>
-              </a:ext>
-            </a:extLst>
-          </p:cNvPr>
-          <p:cNvPicPr>
-            <a:picLocks noChangeAspect="1" noChangeArrowheads="1"/>
-          </p:cNvPicPr>
-          <p:nvPr/>
-        </p:nvPicPr>
-        <p:blipFill rotWithShape="1">
-          <a:blip r:embed="rId2">
-            <a:alphaModFix/>
-            <a:extLst>
-              <a:ext uri="{28A0092B-C50C-407E-A947-70E740481C1C}">
-                <a14:useLocalDpi xmlns:a14="http://schemas.microsoft.com/office/drawing/2010/main" val="0"/>
-              </a:ext>
-            </a:extLst>
-          </a:blip>
-          <a:srcRect r="548"/>
-          <a:stretch/>
-        </p:blipFill>
-        <p:spPr bwMode="auto">
-          <a:xfrm>
-            <a:off x="314372" y="4851908"/>
-            <a:ext cx="1870411" cy="2006092"/>
-          </a:xfrm>
-          <a:prstGeom prst="rect">
-            <a:avLst/>
-          </a:prstGeom>
-          <a:noFill/>
-          <a:extLst>
-            <a:ext uri="{909E8E84-426E-40DD-AFC4-6F175D3DCCD1}">
-              <a14:hiddenFill xmlns:a14="http://schemas.microsoft.com/office/drawing/2010/main">
-                <a:solidFill>
-                  <a:srgbClr val="FFFFFF"/>
-                </a:solidFill>
-              </a14:hiddenFill>
-            </a:ext>
-          </a:extLst>
-        </p:spPr>
-      </p:pic>
-      <p:pic>
-        <p:nvPicPr>
-          <p:cNvPr id="5" name="Picture 6" descr="temperature and humidity sensor">
-            <a:extLst>
-              <a:ext uri="{FF2B5EF4-FFF2-40B4-BE49-F238E27FC236}">
-                <a16:creationId xmlns:a16="http://schemas.microsoft.com/office/drawing/2014/main" id="{B285B2BE-0AF8-4A57-823E-D0EFFB44C254}"/>
-              </a:ext>
-            </a:extLst>
-          </p:cNvPr>
-          <p:cNvPicPr>
-            <a:picLocks noChangeAspect="1" noChangeArrowheads="1"/>
-          </p:cNvPicPr>
-          <p:nvPr/>
-        </p:nvPicPr>
-        <p:blipFill>
-          <a:blip r:embed="rId3">
-            <a:extLst>
-              <a:ext uri="{28A0092B-C50C-407E-A947-70E740481C1C}">
-                <a14:useLocalDpi xmlns:a14="http://schemas.microsoft.com/office/drawing/2010/main" val="0"/>
-              </a:ext>
-            </a:extLst>
-          </a:blip>
-          <a:srcRect/>
-          <a:stretch>
-            <a:fillRect/>
-          </a:stretch>
-        </p:blipFill>
-        <p:spPr bwMode="auto">
-          <a:xfrm rot="18635752">
-            <a:off x="1092002" y="6225041"/>
-            <a:ext cx="315149" cy="315149"/>
-          </a:xfrm>
-          <a:prstGeom prst="rect">
-            <a:avLst/>
-          </a:prstGeom>
-          <a:noFill/>
-          <a:extLst>
-            <a:ext uri="{909E8E84-426E-40DD-AFC4-6F175D3DCCD1}">
-              <a14:hiddenFill xmlns:a14="http://schemas.microsoft.com/office/drawing/2010/main">
-                <a:solidFill>
-                  <a:srgbClr val="FFFFFF"/>
-                </a:solidFill>
-              </a14:hiddenFill>
-            </a:ext>
-          </a:extLst>
-        </p:spPr>
-      </p:pic>
-      <p:pic>
-        <p:nvPicPr>
-          <p:cNvPr id="6" name="Picture 8" descr="Alert Alt Svg Png Icon Free Download (#565392) - OnlineWebFonts.COM">
-            <a:extLst>
-              <a:ext uri="{FF2B5EF4-FFF2-40B4-BE49-F238E27FC236}">
-                <a16:creationId xmlns:a16="http://schemas.microsoft.com/office/drawing/2014/main" id="{2E7665F3-0BAE-4C54-AF17-EF1B6CAB0B8F}"/>
-              </a:ext>
-            </a:extLst>
-          </p:cNvPr>
-          <p:cNvPicPr>
-            <a:picLocks noChangeAspect="1" noChangeArrowheads="1"/>
-          </p:cNvPicPr>
-          <p:nvPr/>
-        </p:nvPicPr>
-        <p:blipFill rotWithShape="1">
-          <a:blip r:embed="rId4">
-            <a:duotone>
-              <a:schemeClr val="accent2">
-                <a:shade val="45000"/>
-                <a:satMod val="135000"/>
-              </a:schemeClr>
-              <a:prstClr val="white"/>
-            </a:duotone>
-            <a:alphaModFix/>
-            <a:extLst>
-              <a:ext uri="{BEBA8EAE-BF5A-486C-A8C5-ECC9F3942E4B}">
-                <a14:imgProps xmlns:a14="http://schemas.microsoft.com/office/drawing/2010/main">
-                  <a14:imgLayer r:embed="rId5">
-                    <a14:imgEffect>
-                      <a14:colorTemperature colorTemp="6360"/>
-                    </a14:imgEffect>
-                    <a14:imgEffect>
-                      <a14:saturation sat="191000"/>
-                    </a14:imgEffect>
-                  </a14:imgLayer>
-                </a14:imgProps>
-              </a:ext>
-              <a:ext uri="{28A0092B-C50C-407E-A947-70E740481C1C}">
-                <a14:useLocalDpi xmlns:a14="http://schemas.microsoft.com/office/drawing/2010/main" val="0"/>
-              </a:ext>
-            </a:extLst>
-          </a:blip>
-          <a:srcRect b="72111"/>
-          <a:stretch/>
-        </p:blipFill>
-        <p:spPr bwMode="auto">
-          <a:xfrm rot="13158707">
-            <a:off x="841771" y="6471416"/>
-            <a:ext cx="491158" cy="209764"/>
-          </a:xfrm>
-          <a:prstGeom prst="rect">
-            <a:avLst/>
-          </a:prstGeom>
-          <a:noFill/>
-          <a:ln>
-            <a:noFill/>
-          </a:ln>
-        </p:spPr>
-      </p:pic>
-      <p:pic>
-        <p:nvPicPr>
-          <p:cNvPr id="1026" name="Picture 2" descr="poste elétrico - ícones de eletrônicos grátis">
-            <a:extLst>
-              <a:ext uri="{FF2B5EF4-FFF2-40B4-BE49-F238E27FC236}">
-                <a16:creationId xmlns:a16="http://schemas.microsoft.com/office/drawing/2014/main" id="{49B43E45-D4D5-48F4-8B57-4A932C3C7CD5}"/>
-              </a:ext>
-            </a:extLst>
-          </p:cNvPr>
-          <p:cNvPicPr>
-            <a:picLocks noChangeAspect="1" noChangeArrowheads="1"/>
-          </p:cNvPicPr>
-          <p:nvPr/>
-        </p:nvPicPr>
-        <p:blipFill>
-          <a:blip r:embed="rId6">
-            <a:extLst>
-              <a:ext uri="{28A0092B-C50C-407E-A947-70E740481C1C}">
-                <a14:useLocalDpi xmlns:a14="http://schemas.microsoft.com/office/drawing/2010/main" val="0"/>
-              </a:ext>
-            </a:extLst>
-          </a:blip>
-          <a:srcRect/>
-          <a:stretch>
-            <a:fillRect/>
-          </a:stretch>
-        </p:blipFill>
-        <p:spPr bwMode="auto">
-          <a:xfrm>
-            <a:off x="2708610" y="3143029"/>
-            <a:ext cx="1708879" cy="1708879"/>
-          </a:xfrm>
-          <a:prstGeom prst="rect">
-            <a:avLst/>
-          </a:prstGeom>
-          <a:noFill/>
-          <a:extLst>
-            <a:ext uri="{909E8E84-426E-40DD-AFC4-6F175D3DCCD1}">
-              <a14:hiddenFill xmlns:a14="http://schemas.microsoft.com/office/drawing/2010/main">
-                <a:solidFill>
-                  <a:srgbClr val="FFFFFF"/>
-                </a:solidFill>
-              </a14:hiddenFill>
-            </a:ext>
-          </a:extLst>
-        </p:spPr>
-      </p:pic>
-      <p:pic>
-        <p:nvPicPr>
-          <p:cNvPr id="1030" name="Picture 6" descr="Roteador Wi-Fi Ícone - Download Grátis, PNG e Vetores">
-            <a:extLst>
-              <a:ext uri="{FF2B5EF4-FFF2-40B4-BE49-F238E27FC236}">
-                <a16:creationId xmlns:a16="http://schemas.microsoft.com/office/drawing/2014/main" id="{7A8BDA75-8082-4131-8F58-CCE859769CBD}"/>
-              </a:ext>
-            </a:extLst>
-          </p:cNvPr>
-          <p:cNvPicPr>
-            <a:picLocks noChangeAspect="1" noChangeArrowheads="1"/>
-          </p:cNvPicPr>
-          <p:nvPr/>
-        </p:nvPicPr>
-        <p:blipFill rotWithShape="1">
-          <a:blip r:embed="rId7">
-            <a:extLst>
-              <a:ext uri="{28A0092B-C50C-407E-A947-70E740481C1C}">
-                <a14:useLocalDpi xmlns:a14="http://schemas.microsoft.com/office/drawing/2010/main" val="0"/>
-              </a:ext>
-            </a:extLst>
-          </a:blip>
-          <a:srcRect r="5484" b="5242"/>
-          <a:stretch/>
-        </p:blipFill>
-        <p:spPr bwMode="auto">
-          <a:xfrm>
-            <a:off x="2708612" y="2809952"/>
-            <a:ext cx="742512" cy="744410"/>
-          </a:xfrm>
-          <a:prstGeom prst="rect">
-            <a:avLst/>
-          </a:prstGeom>
-          <a:noFill/>
-          <a:extLst>
-            <a:ext uri="{909E8E84-426E-40DD-AFC4-6F175D3DCCD1}">
-              <a14:hiddenFill xmlns:a14="http://schemas.microsoft.com/office/drawing/2010/main">
-                <a:solidFill>
-                  <a:srgbClr val="FFFFFF"/>
-                </a:solidFill>
-              </a14:hiddenFill>
-            </a:ext>
-          </a:extLst>
-        </p:spPr>
-      </p:pic>
-      <p:pic>
-        <p:nvPicPr>
-          <p:cNvPr id="1032" name="Picture 8" descr="ícone Servidor Livre de WHCompare Isometric Web Hosting &amp; Servers">
-            <a:extLst>
-              <a:ext uri="{FF2B5EF4-FFF2-40B4-BE49-F238E27FC236}">
-                <a16:creationId xmlns:a16="http://schemas.microsoft.com/office/drawing/2014/main" id="{CBDCF82D-42C4-4EB5-BDEF-78695D8EACC1}"/>
-              </a:ext>
-            </a:extLst>
-          </p:cNvPr>
-          <p:cNvPicPr>
-            <a:picLocks noChangeAspect="1" noChangeArrowheads="1"/>
-          </p:cNvPicPr>
-          <p:nvPr/>
-        </p:nvPicPr>
-        <p:blipFill>
-          <a:blip r:embed="rId8">
-            <a:extLst>
-              <a:ext uri="{28A0092B-C50C-407E-A947-70E740481C1C}">
-                <a14:useLocalDpi xmlns:a14="http://schemas.microsoft.com/office/drawing/2010/main" val="0"/>
-              </a:ext>
-            </a:extLst>
-          </a:blip>
-          <a:srcRect/>
-          <a:stretch>
-            <a:fillRect/>
-          </a:stretch>
-        </p:blipFill>
-        <p:spPr bwMode="auto">
-          <a:xfrm>
-            <a:off x="4941316" y="4759790"/>
-            <a:ext cx="2190327" cy="2190327"/>
-          </a:xfrm>
-          <a:prstGeom prst="rect">
-            <a:avLst/>
-          </a:prstGeom>
-          <a:noFill/>
-          <a:extLst>
-            <a:ext uri="{909E8E84-426E-40DD-AFC4-6F175D3DCCD1}">
-              <a14:hiddenFill xmlns:a14="http://schemas.microsoft.com/office/drawing/2010/main">
-                <a:solidFill>
-                  <a:srgbClr val="FFFFFF"/>
-                </a:solidFill>
-              </a14:hiddenFill>
-            </a:ext>
-          </a:extLst>
-        </p:spPr>
-      </p:pic>
-      <p:pic>
-        <p:nvPicPr>
-          <p:cNvPr id="1034" name="Picture 10" descr="Person using computer icon vector illustration design.">
-            <a:extLst>
-              <a:ext uri="{FF2B5EF4-FFF2-40B4-BE49-F238E27FC236}">
-                <a16:creationId xmlns:a16="http://schemas.microsoft.com/office/drawing/2014/main" id="{54807AD0-A037-46D2-9142-5A86027BD3DE}"/>
-              </a:ext>
-            </a:extLst>
-          </p:cNvPr>
-          <p:cNvPicPr>
-            <a:picLocks noChangeAspect="1" noChangeArrowheads="1"/>
-          </p:cNvPicPr>
-          <p:nvPr/>
-        </p:nvPicPr>
-        <p:blipFill rotWithShape="1">
-          <a:blip r:embed="rId9">
-            <a:extLst>
-              <a:ext uri="{28A0092B-C50C-407E-A947-70E740481C1C}">
-                <a14:useLocalDpi xmlns:a14="http://schemas.microsoft.com/office/drawing/2010/main" val="0"/>
-              </a:ext>
-            </a:extLst>
-          </a:blip>
-          <a:srcRect b="20960"/>
-          <a:stretch/>
-        </p:blipFill>
-        <p:spPr bwMode="auto">
-          <a:xfrm>
-            <a:off x="7774512" y="2947883"/>
-            <a:ext cx="1940641" cy="1661705"/>
-          </a:xfrm>
-          <a:prstGeom prst="rect">
-            <a:avLst/>
-          </a:prstGeom>
-          <a:noFill/>
-          <a:extLst>
-            <a:ext uri="{909E8E84-426E-40DD-AFC4-6F175D3DCCD1}">
-              <a14:hiddenFill xmlns:a14="http://schemas.microsoft.com/office/drawing/2010/main">
-                <a:solidFill>
-                  <a:srgbClr val="FFFFFF"/>
-                </a:solidFill>
-              </a14:hiddenFill>
-            </a:ext>
-          </a:extLst>
-        </p:spPr>
-      </p:pic>
-      <p:pic>
-        <p:nvPicPr>
-          <p:cNvPr id="1036" name="Picture 12" descr="computer, desktop, laptop, mac, monitor, pc, screen icon | Conjunto de  ícones, Conjunto de">
-            <a:extLst>
-              <a:ext uri="{FF2B5EF4-FFF2-40B4-BE49-F238E27FC236}">
-                <a16:creationId xmlns:a16="http://schemas.microsoft.com/office/drawing/2014/main" id="{207611DD-ED0F-4EF6-86BE-D157312D68E1}"/>
-              </a:ext>
-            </a:extLst>
-          </p:cNvPr>
-          <p:cNvPicPr>
-            <a:picLocks noChangeAspect="1" noChangeArrowheads="1"/>
-          </p:cNvPicPr>
-          <p:nvPr/>
-        </p:nvPicPr>
-        <p:blipFill>
-          <a:blip r:embed="rId10">
-            <a:extLst>
-              <a:ext uri="{28A0092B-C50C-407E-A947-70E740481C1C}">
-                <a14:useLocalDpi xmlns:a14="http://schemas.microsoft.com/office/drawing/2010/main" val="0"/>
-              </a:ext>
-            </a:extLst>
-          </a:blip>
-          <a:srcRect/>
-          <a:stretch>
-            <a:fillRect/>
-          </a:stretch>
-        </p:blipFill>
-        <p:spPr bwMode="auto">
-          <a:xfrm>
-            <a:off x="9560874" y="2906200"/>
-            <a:ext cx="2190327" cy="1981045"/>
-          </a:xfrm>
-          <a:prstGeom prst="rect">
-            <a:avLst/>
-          </a:prstGeom>
-          <a:noFill/>
-          <a:extLst>
-            <a:ext uri="{909E8E84-426E-40DD-AFC4-6F175D3DCCD1}">
-              <a14:hiddenFill xmlns:a14="http://schemas.microsoft.com/office/drawing/2010/main">
-                <a:solidFill>
-                  <a:srgbClr val="FFFFFF"/>
-                </a:solidFill>
-              </a14:hiddenFill>
-            </a:ext>
-          </a:extLst>
-        </p:spPr>
-      </p:pic>
-      <p:sp>
-        <p:nvSpPr>
-          <p:cNvPr id="7" name="CaixaDeTexto 6">
-            <a:extLst>
-              <a:ext uri="{FF2B5EF4-FFF2-40B4-BE49-F238E27FC236}">
-                <a16:creationId xmlns:a16="http://schemas.microsoft.com/office/drawing/2014/main" id="{C3D9AF88-2C98-4553-B0A1-E0B2F86C0658}"/>
-              </a:ext>
-            </a:extLst>
-          </p:cNvPr>
-          <p:cNvSpPr txBox="1"/>
-          <p:nvPr/>
-        </p:nvSpPr>
-        <p:spPr>
-          <a:xfrm>
-            <a:off x="9674157" y="3169442"/>
-            <a:ext cx="2077044" cy="830997"/>
-          </a:xfrm>
-          <a:prstGeom prst="rect">
-            <a:avLst/>
-          </a:prstGeom>
-          <a:noFill/>
-        </p:spPr>
-        <p:txBody>
-          <a:bodyPr wrap="square" rtlCol="0">
-            <a:spAutoFit/>
-          </a:bodyPr>
-          <a:lstStyle/>
-          <a:p>
-            <a:r>
-              <a:rPr lang="pt-BR" sz="1600" b="1" dirty="0">
-                <a:latin typeface="Arial" panose="020B0604020202020204" pitchFamily="34" charset="0"/>
-                <a:cs typeface="Arial" panose="020B0604020202020204" pitchFamily="34" charset="0"/>
-              </a:rPr>
-              <a:t>Sensor 3 detectou um possível vazamento</a:t>
-            </a:r>
-          </a:p>
-        </p:txBody>
-      </p:sp>
-      <p:sp>
-        <p:nvSpPr>
-          <p:cNvPr id="12" name="Seta: Dobrada 11">
-            <a:extLst>
-              <a:ext uri="{FF2B5EF4-FFF2-40B4-BE49-F238E27FC236}">
-                <a16:creationId xmlns:a16="http://schemas.microsoft.com/office/drawing/2014/main" id="{4366ED66-17D2-466D-B291-EE6FBF8C3D21}"/>
-              </a:ext>
-            </a:extLst>
-          </p:cNvPr>
-          <p:cNvSpPr/>
-          <p:nvPr/>
-        </p:nvSpPr>
-        <p:spPr>
-          <a:xfrm>
-            <a:off x="1012728" y="3308498"/>
-            <a:ext cx="1459034" cy="1377939"/>
-          </a:xfrm>
-          <a:prstGeom prst="bentArrow">
-            <a:avLst/>
-          </a:prstGeom>
-          <a:solidFill>
-            <a:schemeClr val="tx1"/>
-          </a:solidFill>
-          <a:ln w="28575">
-            <a:solidFill>
-              <a:schemeClr val="accent1"/>
-            </a:solidFill>
-          </a:ln>
-        </p:spPr>
-        <p:style>
-          <a:lnRef idx="2">
-            <a:schemeClr val="accent1">
-              <a:shade val="50000"/>
-            </a:schemeClr>
-          </a:lnRef>
-          <a:fillRef idx="1">
-            <a:schemeClr val="accent1"/>
-          </a:fillRef>
-          <a:effectRef idx="0">
-            <a:schemeClr val="accent1"/>
-          </a:effectRef>
-          <a:fontRef idx="minor">
-            <a:schemeClr val="lt1"/>
-          </a:fontRef>
-        </p:style>
-        <p:txBody>
-          <a:bodyPr rtlCol="0" anchor="ctr"/>
-          <a:lstStyle/>
-          <a:p>
-            <a:pPr algn="ctr"/>
-            <a:endParaRPr lang="pt-BR">
-              <a:solidFill>
-                <a:schemeClr val="tx1"/>
-              </a:solidFill>
-            </a:endParaRPr>
-          </a:p>
-        </p:txBody>
-      </p:sp>
-      <p:sp>
-        <p:nvSpPr>
-          <p:cNvPr id="27" name="Seta: Dobrada 26">
-            <a:extLst>
-              <a:ext uri="{FF2B5EF4-FFF2-40B4-BE49-F238E27FC236}">
-                <a16:creationId xmlns:a16="http://schemas.microsoft.com/office/drawing/2014/main" id="{E1B164E1-E2B1-4315-87E5-DFE21A4AE3F1}"/>
-              </a:ext>
-            </a:extLst>
-          </p:cNvPr>
-          <p:cNvSpPr/>
-          <p:nvPr/>
-        </p:nvSpPr>
-        <p:spPr>
-          <a:xfrm rot="5400000">
-            <a:off x="4933089" y="3202886"/>
-            <a:ext cx="1258227" cy="1708879"/>
-          </a:xfrm>
-          <a:prstGeom prst="bentArrow">
-            <a:avLst>
-              <a:gd name="adj1" fmla="val 25000"/>
-              <a:gd name="adj2" fmla="val 25535"/>
-              <a:gd name="adj3" fmla="val 25000"/>
-              <a:gd name="adj4" fmla="val 43750"/>
-            </a:avLst>
-          </a:prstGeom>
-          <a:solidFill>
-            <a:schemeClr val="tx1"/>
-          </a:solidFill>
-          <a:ln w="28575">
-            <a:solidFill>
-              <a:schemeClr val="accent1"/>
-            </a:solidFill>
-          </a:ln>
-        </p:spPr>
-        <p:style>
-          <a:lnRef idx="2">
-            <a:schemeClr val="accent1">
-              <a:shade val="50000"/>
-            </a:schemeClr>
-          </a:lnRef>
-          <a:fillRef idx="1">
-            <a:schemeClr val="accent1"/>
-          </a:fillRef>
-          <a:effectRef idx="0">
-            <a:schemeClr val="accent1"/>
-          </a:effectRef>
-          <a:fontRef idx="minor">
-            <a:schemeClr val="lt1"/>
-          </a:fontRef>
-        </p:style>
-        <p:txBody>
-          <a:bodyPr rtlCol="0" anchor="ctr"/>
-          <a:lstStyle/>
-          <a:p>
-            <a:pPr algn="ctr"/>
-            <a:endParaRPr lang="pt-BR">
-              <a:solidFill>
-                <a:schemeClr val="tx1"/>
-              </a:solidFill>
-            </a:endParaRPr>
-          </a:p>
-        </p:txBody>
-      </p:sp>
-      <p:sp>
-        <p:nvSpPr>
-          <p:cNvPr id="30" name="Seta: Dobrada 29">
-            <a:extLst>
-              <a:ext uri="{FF2B5EF4-FFF2-40B4-BE49-F238E27FC236}">
-                <a16:creationId xmlns:a16="http://schemas.microsoft.com/office/drawing/2014/main" id="{CDD5915B-A970-438D-BF62-32FB5A19344B}"/>
-              </a:ext>
-            </a:extLst>
-          </p:cNvPr>
-          <p:cNvSpPr/>
-          <p:nvPr/>
-        </p:nvSpPr>
-        <p:spPr>
-          <a:xfrm rot="5400000" flipH="1">
-            <a:off x="7666041" y="4223741"/>
-            <a:ext cx="1360433" cy="2429231"/>
-          </a:xfrm>
-          <a:prstGeom prst="bentArrow">
-            <a:avLst>
-              <a:gd name="adj1" fmla="val 25000"/>
-              <a:gd name="adj2" fmla="val 25535"/>
-              <a:gd name="adj3" fmla="val 25000"/>
-              <a:gd name="adj4" fmla="val 43750"/>
-            </a:avLst>
-          </a:prstGeom>
-          <a:solidFill>
-            <a:schemeClr val="tx1"/>
-          </a:solidFill>
-          <a:ln w="28575">
-            <a:solidFill>
-              <a:schemeClr val="accent1"/>
-            </a:solidFill>
-          </a:ln>
-        </p:spPr>
-        <p:style>
-          <a:lnRef idx="2">
-            <a:schemeClr val="accent1">
-              <a:shade val="50000"/>
-            </a:schemeClr>
-          </a:lnRef>
-          <a:fillRef idx="1">
-            <a:schemeClr val="accent1"/>
-          </a:fillRef>
-          <a:effectRef idx="0">
-            <a:schemeClr val="accent1"/>
-          </a:effectRef>
-          <a:fontRef idx="minor">
-            <a:schemeClr val="lt1"/>
-          </a:fontRef>
-        </p:style>
-        <p:txBody>
-          <a:bodyPr rtlCol="0" anchor="ctr"/>
-          <a:lstStyle/>
-          <a:p>
-            <a:pPr algn="ctr"/>
-            <a:endParaRPr lang="pt-BR">
-              <a:solidFill>
-                <a:schemeClr val="tx1"/>
-              </a:solidFill>
-            </a:endParaRPr>
-          </a:p>
-        </p:txBody>
-      </p:sp>
-      <p:cxnSp>
-        <p:nvCxnSpPr>
-          <p:cNvPr id="18" name="Conector reto 17">
-            <a:extLst>
-              <a:ext uri="{FF2B5EF4-FFF2-40B4-BE49-F238E27FC236}">
-                <a16:creationId xmlns:a16="http://schemas.microsoft.com/office/drawing/2014/main" id="{6105CB52-E11F-4E14-B6A3-6554486FA74A}"/>
-              </a:ext>
-            </a:extLst>
-          </p:cNvPr>
-          <p:cNvCxnSpPr/>
-          <p:nvPr/>
-        </p:nvCxnSpPr>
-        <p:spPr>
-          <a:xfrm>
-            <a:off x="377585" y="2035278"/>
-            <a:ext cx="11436829" cy="0"/>
-          </a:xfrm>
-          <a:prstGeom prst="line">
-            <a:avLst/>
-          </a:prstGeom>
-          <a:ln>
-            <a:solidFill>
-              <a:schemeClr val="tx1"/>
-            </a:solidFill>
-          </a:ln>
-        </p:spPr>
-        <p:style>
-          <a:lnRef idx="3">
-            <a:schemeClr val="dk1"/>
-          </a:lnRef>
-          <a:fillRef idx="0">
-            <a:schemeClr val="dk1"/>
-          </a:fillRef>
-          <a:effectRef idx="2">
-            <a:schemeClr val="dk1"/>
-          </a:effectRef>
-          <a:fontRef idx="minor">
-            <a:schemeClr val="tx1"/>
-          </a:fontRef>
-        </p:style>
-      </p:cxnSp>
-      <p:pic>
-        <p:nvPicPr>
-          <p:cNvPr id="33" name="Imagem 32">
-            <a:extLst>
-              <a:ext uri="{FF2B5EF4-FFF2-40B4-BE49-F238E27FC236}">
-                <a16:creationId xmlns:a16="http://schemas.microsoft.com/office/drawing/2014/main" id="{B7DA62BD-20DE-46B7-A3D7-DC7738701FEC}"/>
+          <p:cNvPr id="5" name="Imagem 4">
+            <a:extLst>
+              <a:ext uri="{FF2B5EF4-FFF2-40B4-BE49-F238E27FC236}">
+                <a16:creationId xmlns:a16="http://schemas.microsoft.com/office/drawing/2014/main" id="{0C2BFC19-2020-4662-A843-CC5FA82B755D}"/>
               </a:ext>
             </a:extLst>
           </p:cNvPr>
@@ -8717,7 +9866,7 @@
           <p:nvPr/>
         </p:nvPicPr>
         <p:blipFill>
-          <a:blip r:embed="rId11"/>
+          <a:blip r:embed="rId4"/>
           <a:stretch>
             <a:fillRect/>
           </a:stretch>
@@ -8735,7 +9884,7 @@
     </p:spTree>
     <p:extLst>
       <p:ext uri="{BB962C8B-B14F-4D97-AF65-F5344CB8AC3E}">
-        <p14:creationId xmlns:p14="http://schemas.microsoft.com/office/powerpoint/2010/main" val="1654437090"/>
+        <p14:creationId xmlns:p14="http://schemas.microsoft.com/office/powerpoint/2010/main" val="1663262286"/>
       </p:ext>
     </p:extLst>
   </p:cSld>

</xml_diff>